<commit_message>
Write slides about files and list comprehensions.
</commit_message>
<xml_diff>
--- a/slides.pptx
+++ b/slides.pptx
@@ -5,7 +5,7 @@
     <p:sldMasterId id="2147483767" r:id="rId1"/>
   </p:sldMasterIdLst>
   <p:notesMasterIdLst>
-    <p:notesMasterId r:id="rId31"/>
+    <p:notesMasterId r:id="rId37"/>
   </p:notesMasterIdLst>
   <p:sldIdLst>
     <p:sldId id="256" r:id="rId2"/>
@@ -27,16 +27,22 @@
     <p:sldId id="259" r:id="rId18"/>
     <p:sldId id="280" r:id="rId19"/>
     <p:sldId id="281" r:id="rId20"/>
-    <p:sldId id="282" r:id="rId21"/>
-    <p:sldId id="284" r:id="rId22"/>
-    <p:sldId id="283" r:id="rId23"/>
-    <p:sldId id="285" r:id="rId24"/>
-    <p:sldId id="286" r:id="rId25"/>
-    <p:sldId id="287" r:id="rId26"/>
-    <p:sldId id="288" r:id="rId27"/>
-    <p:sldId id="289" r:id="rId28"/>
-    <p:sldId id="262" r:id="rId29"/>
-    <p:sldId id="267" r:id="rId30"/>
+    <p:sldId id="292" r:id="rId21"/>
+    <p:sldId id="282" r:id="rId22"/>
+    <p:sldId id="284" r:id="rId23"/>
+    <p:sldId id="283" r:id="rId24"/>
+    <p:sldId id="285" r:id="rId25"/>
+    <p:sldId id="286" r:id="rId26"/>
+    <p:sldId id="287" r:id="rId27"/>
+    <p:sldId id="288" r:id="rId28"/>
+    <p:sldId id="289" r:id="rId29"/>
+    <p:sldId id="290" r:id="rId30"/>
+    <p:sldId id="291" r:id="rId31"/>
+    <p:sldId id="294" r:id="rId32"/>
+    <p:sldId id="295" r:id="rId33"/>
+    <p:sldId id="293" r:id="rId34"/>
+    <p:sldId id="262" r:id="rId35"/>
+    <p:sldId id="267" r:id="rId36"/>
   </p:sldIdLst>
   <p:sldSz cx="12192000" cy="6858000"/>
   <p:notesSz cx="6858000" cy="9144000"/>
@@ -164,10 +170,19 @@
             <p14:sldId id="275"/>
             <p14:sldId id="277"/>
             <p14:sldId id="279"/>
+          </p14:sldIdLst>
+        </p14:section>
+        <p14:section name="Fonctions" id="{DEE91048-6464-4551-80F1-70D9E4BAA9B3}">
+          <p14:sldIdLst>
             <p14:sldId id="259"/>
             <p14:sldId id="280"/>
             <p14:sldId id="281"/>
+            <p14:sldId id="292"/>
             <p14:sldId id="282"/>
+          </p14:sldIdLst>
+        </p14:section>
+        <p14:section name="Structures de données" id="{49683F6E-E8EC-44C0-B88A-404B856C8502}">
+          <p14:sldIdLst>
             <p14:sldId id="284"/>
             <p14:sldId id="283"/>
             <p14:sldId id="285"/>
@@ -175,6 +190,11 @@
             <p14:sldId id="287"/>
             <p14:sldId id="288"/>
             <p14:sldId id="289"/>
+            <p14:sldId id="290"/>
+            <p14:sldId id="291"/>
+            <p14:sldId id="294"/>
+            <p14:sldId id="295"/>
+            <p14:sldId id="293"/>
           </p14:sldIdLst>
         </p14:section>
         <p14:section name="Orienté objet" id="{1156A34A-95D4-45F6-BE97-3E57B477A2EF}">
@@ -1202,6 +1222,183 @@
     <p:extLst>
       <p:ext uri="{BB962C8B-B14F-4D97-AF65-F5344CB8AC3E}">
         <p14:creationId xmlns:p14="http://schemas.microsoft.com/office/powerpoint/2010/main" val="225942996"/>
+      </p:ext>
+    </p:extLst>
+  </p:cSld>
+  <p:clrMapOvr>
+    <a:masterClrMapping/>
+  </p:clrMapOvr>
+</p:notes>
+</file>
+
+<file path=ppt/notesSlides/notesSlide5.xml><?xml version="1.0" encoding="utf-8"?>
+<p:notes xmlns:a="http://schemas.openxmlformats.org/drawingml/2006/main" xmlns:r="http://schemas.openxmlformats.org/officeDocument/2006/relationships" xmlns:p="http://schemas.openxmlformats.org/presentationml/2006/main">
+  <p:cSld>
+    <p:spTree>
+      <p:nvGrpSpPr>
+        <p:cNvPr id="1" name=""/>
+        <p:cNvGrpSpPr/>
+        <p:nvPr/>
+      </p:nvGrpSpPr>
+      <p:grpSpPr>
+        <a:xfrm>
+          <a:off x="0" y="0"/>
+          <a:ext cx="0" cy="0"/>
+          <a:chOff x="0" y="0"/>
+          <a:chExt cx="0" cy="0"/>
+        </a:xfrm>
+      </p:grpSpPr>
+      <p:sp>
+        <p:nvSpPr>
+          <p:cNvPr id="2" name="Espace réservé de l'image des diapositives 1"/>
+          <p:cNvSpPr>
+            <a:spLocks noGrp="1" noRot="1" noChangeAspect="1"/>
+          </p:cNvSpPr>
+          <p:nvPr>
+            <p:ph type="sldImg"/>
+          </p:nvPr>
+        </p:nvSpPr>
+        <p:spPr/>
+      </p:sp>
+      <p:sp>
+        <p:nvSpPr>
+          <p:cNvPr id="3" name="Espace réservé des notes 2"/>
+          <p:cNvSpPr>
+            <a:spLocks noGrp="1"/>
+          </p:cNvSpPr>
+          <p:nvPr>
+            <p:ph type="body" idx="1"/>
+          </p:nvPr>
+        </p:nvSpPr>
+        <p:spPr/>
+        <p:txBody>
+          <a:bodyPr/>
+          <a:lstStyle/>
+          <a:p>
+            <a:r>
+              <a:rPr lang="en-150" dirty="0"/>
+              <a:t>R</a:t>
+            </a:r>
+            <a:r>
+              <a:rPr lang="fr-BE" dirty="0"/>
+              <a:t>ô</a:t>
+            </a:r>
+            <a:r>
+              <a:rPr lang="en-150" dirty="0"/>
+              <a:t>l</a:t>
+            </a:r>
+            <a:r>
+              <a:rPr lang="fr-BE" dirty="0"/>
+              <a:t>e</a:t>
+            </a:r>
+            <a:r>
+              <a:rPr lang="en-150" dirty="0"/>
+              <a:t> </a:t>
+            </a:r>
+            <a:r>
+              <a:rPr lang="fr-BE" dirty="0"/>
+              <a:t>d</a:t>
+            </a:r>
+            <a:r>
+              <a:rPr lang="en-150" dirty="0"/>
+              <a:t>e </a:t>
+            </a:r>
+            <a:r>
+              <a:rPr lang="fr-BE" dirty="0"/>
+              <a:t>l</a:t>
+            </a:r>
+            <a:r>
+              <a:rPr lang="en-150" dirty="0"/>
+              <a:t>'</a:t>
+            </a:r>
+            <a:r>
+              <a:rPr lang="fr-BE" dirty="0"/>
+              <a:t>i</a:t>
+            </a:r>
+            <a:r>
+              <a:rPr lang="en-150" dirty="0"/>
+              <a:t>n</a:t>
+            </a:r>
+            <a:r>
+              <a:rPr lang="fr-BE" dirty="0"/>
+              <a:t>d</a:t>
+            </a:r>
+            <a:r>
+              <a:rPr lang="en-150" dirty="0"/>
+              <a:t>e</a:t>
+            </a:r>
+            <a:r>
+              <a:rPr lang="fr-BE" dirty="0"/>
+              <a:t>n</a:t>
+            </a:r>
+            <a:r>
+              <a:rPr lang="en-150" dirty="0"/>
+              <a:t>t</a:t>
+            </a:r>
+            <a:r>
+              <a:rPr lang="fr-BE" dirty="0"/>
+              <a:t>a</a:t>
+            </a:r>
+            <a:r>
+              <a:rPr lang="en-150" dirty="0"/>
+              <a:t>t</a:t>
+            </a:r>
+            <a:r>
+              <a:rPr lang="fr-BE" dirty="0"/>
+              <a:t>i</a:t>
+            </a:r>
+            <a:r>
+              <a:rPr lang="en-150" dirty="0"/>
+              <a:t>o</a:t>
+            </a:r>
+            <a:r>
+              <a:rPr lang="fr-BE" dirty="0"/>
+              <a:t>n</a:t>
+            </a:r>
+            <a:endParaRPr lang="en-150" dirty="0"/>
+          </a:p>
+          <a:p>
+            <a:r>
+              <a:rPr lang="en-150" dirty="0"/>
+              <a:t>Default params</a:t>
+            </a:r>
+          </a:p>
+          <a:p>
+            <a:r>
+              <a:rPr lang="en-150" dirty="0"/>
+              <a:t>Packing and unpacking</a:t>
+            </a:r>
+            <a:endParaRPr lang="fr-BE" dirty="0"/>
+          </a:p>
+        </p:txBody>
+      </p:sp>
+      <p:sp>
+        <p:nvSpPr>
+          <p:cNvPr id="4" name="Espace réservé du numéro de diapositive 3"/>
+          <p:cNvSpPr>
+            <a:spLocks noGrp="1"/>
+          </p:cNvSpPr>
+          <p:nvPr>
+            <p:ph type="sldNum" sz="quarter" idx="5"/>
+          </p:nvPr>
+        </p:nvSpPr>
+        <p:spPr/>
+        <p:txBody>
+          <a:bodyPr/>
+          <a:lstStyle/>
+          <a:p>
+            <a:fld id="{D514CAC8-E575-4AA6-990F-2A2D5B2618F3}" type="slidenum">
+              <a:rPr lang="fr-BE" smtClean="0"/>
+              <a:t>20</a:t>
+            </a:fld>
+            <a:endParaRPr lang="fr-BE"/>
+          </a:p>
+        </p:txBody>
+      </p:sp>
+    </p:spTree>
+    <p:extLst>
+      <p:ext uri="{BB962C8B-B14F-4D97-AF65-F5344CB8AC3E}">
+        <p14:creationId xmlns:p14="http://schemas.microsoft.com/office/powerpoint/2010/main" val="1883996634"/>
       </p:ext>
     </p:extLst>
   </p:cSld>
@@ -7250,10 +7447,10 @@
       </p:grpSpPr>
       <p:sp>
         <p:nvSpPr>
-          <p:cNvPr id="2" name="Titre 1">
+          <p:cNvPr id="5" name="Titre 4">
             <a:extLst>
               <a:ext uri="{FF2B5EF4-FFF2-40B4-BE49-F238E27FC236}">
-                <a16:creationId xmlns:a16="http://schemas.microsoft.com/office/drawing/2014/main" id="{EC23D5C9-626A-4E44-BAC0-FD8936F3F147}"/>
+                <a16:creationId xmlns:a16="http://schemas.microsoft.com/office/drawing/2014/main" id="{678DDB9A-CC74-4008-B60E-537AD60C1A99}"/>
               </a:ext>
             </a:extLst>
           </p:cNvPr>
@@ -7270,40 +7467,8 @@
           <a:lstStyle/>
           <a:p>
             <a:r>
-              <a:rPr lang="en-150" dirty="0"/>
-              <a:t>E</a:t>
-            </a:r>
-            <a:r>
-              <a:rPr lang="fr-BE" dirty="0"/>
-              <a:t>x</a:t>
-            </a:r>
-            <a:r>
-              <a:rPr lang="en-150" dirty="0"/>
-              <a:t>e</a:t>
-            </a:r>
-            <a:r>
-              <a:rPr lang="fr-BE" dirty="0"/>
-              <a:t>r</a:t>
-            </a:r>
-            <a:r>
-              <a:rPr lang="en-150" dirty="0"/>
-              <a:t>c</a:t>
-            </a:r>
-            <a:r>
-              <a:rPr lang="fr-BE" dirty="0"/>
-              <a:t>i</a:t>
-            </a:r>
-            <a:r>
-              <a:rPr lang="en-150" dirty="0"/>
-              <a:t>c</a:t>
-            </a:r>
-            <a:r>
-              <a:rPr lang="fr-BE" dirty="0"/>
-              <a:t>e</a:t>
-            </a:r>
-            <a:r>
-              <a:rPr lang="en-150" dirty="0"/>
-              <a:t> 3</a:t>
+              <a:rPr lang="en-US" dirty="0"/>
+              <a:t>Lambdas</a:t>
             </a:r>
             <a:endParaRPr lang="fr-BE" dirty="0"/>
           </a:p>
@@ -7311,10 +7476,10 @@
       </p:sp>
       <p:sp>
         <p:nvSpPr>
-          <p:cNvPr id="3" name="Espace réservé du contenu 2">
+          <p:cNvPr id="6" name="Espace réservé du contenu 5">
             <a:extLst>
               <a:ext uri="{FF2B5EF4-FFF2-40B4-BE49-F238E27FC236}">
-                <a16:creationId xmlns:a16="http://schemas.microsoft.com/office/drawing/2014/main" id="{2809FA2C-7F1C-4D9B-83FA-DC1D0EF82BE8}"/>
+                <a16:creationId xmlns:a16="http://schemas.microsoft.com/office/drawing/2014/main" id="{77F6AE34-D2D4-49AD-B75D-4116B8FCF824}"/>
               </a:ext>
             </a:extLst>
           </p:cNvPr>
@@ -7327,53 +7492,49 @@
         </p:nvSpPr>
         <p:spPr/>
         <p:txBody>
-          <a:bodyPr/>
+          <a:bodyPr>
+            <a:normAutofit/>
+          </a:bodyPr>
           <a:lstStyle/>
           <a:p>
-            <a:r>
-              <a:rPr lang="en-150" dirty="0"/>
-              <a:t>F</a:t>
-            </a:r>
-            <a:r>
-              <a:rPr lang="fr-BE" dirty="0"/>
-              <a:t>o</a:t>
-            </a:r>
-            <a:r>
-              <a:rPr lang="en-150" dirty="0"/>
-              <a:t>n</a:t>
-            </a:r>
-            <a:r>
-              <a:rPr lang="fr-BE" dirty="0"/>
-              <a:t>c</a:t>
-            </a:r>
-            <a:r>
-              <a:rPr lang="en-150" dirty="0"/>
-              <a:t>t</a:t>
-            </a:r>
-            <a:r>
-              <a:rPr lang="fr-BE" dirty="0"/>
-              <a:t>i</a:t>
-            </a:r>
-            <a:r>
-              <a:rPr lang="en-150" dirty="0"/>
-              <a:t>o</a:t>
-            </a:r>
-            <a:r>
-              <a:rPr lang="fr-BE" dirty="0"/>
-              <a:t>n</a:t>
-            </a:r>
-            <a:r>
-              <a:rPr lang="en-150" dirty="0"/>
-              <a:t>s</a:t>
-            </a:r>
-            <a:endParaRPr lang="fr-BE" dirty="0"/>
+            <a:pPr marL="0" indent="0">
+              <a:buNone/>
+            </a:pPr>
+            <a:r>
+              <a:rPr lang="en-US" sz="1600" dirty="0">
+                <a:latin typeface="Consolas" panose="020B0609020204030204" pitchFamily="49" charset="0"/>
+              </a:rPr>
+              <a:t>squared = lambda x : x ** 2</a:t>
+            </a:r>
+          </a:p>
+          <a:p>
+            <a:pPr marL="0" indent="0">
+              <a:buNone/>
+            </a:pPr>
+            <a:endParaRPr lang="en-US" sz="1600" dirty="0">
+              <a:latin typeface="Consolas" panose="020B0609020204030204" pitchFamily="49" charset="0"/>
+            </a:endParaRPr>
+          </a:p>
+          <a:p>
+            <a:pPr marL="0" indent="0">
+              <a:buNone/>
+            </a:pPr>
+            <a:r>
+              <a:rPr lang="en-US" sz="1600" dirty="0">
+                <a:latin typeface="Consolas" panose="020B0609020204030204" pitchFamily="49" charset="0"/>
+              </a:rPr>
+              <a:t>sum = lambda x, y : x + y</a:t>
+            </a:r>
+            <a:endParaRPr lang="en-150" sz="1600" dirty="0">
+              <a:latin typeface="Consolas" panose="020B0609020204030204" pitchFamily="49" charset="0"/>
+            </a:endParaRPr>
           </a:p>
         </p:txBody>
       </p:sp>
     </p:spTree>
     <p:extLst>
       <p:ext uri="{BB962C8B-B14F-4D97-AF65-F5344CB8AC3E}">
-        <p14:creationId xmlns:p14="http://schemas.microsoft.com/office/powerpoint/2010/main" val="36872158"/>
+        <p14:creationId xmlns:p14="http://schemas.microsoft.com/office/powerpoint/2010/main" val="1816851265"/>
       </p:ext>
     </p:extLst>
   </p:cSld>
@@ -7402,6 +7563,158 @@
       </p:grpSpPr>
       <p:sp>
         <p:nvSpPr>
+          <p:cNvPr id="2" name="Titre 1">
+            <a:extLst>
+              <a:ext uri="{FF2B5EF4-FFF2-40B4-BE49-F238E27FC236}">
+                <a16:creationId xmlns:a16="http://schemas.microsoft.com/office/drawing/2014/main" id="{EC23D5C9-626A-4E44-BAC0-FD8936F3F147}"/>
+              </a:ext>
+            </a:extLst>
+          </p:cNvPr>
+          <p:cNvSpPr>
+            <a:spLocks noGrp="1"/>
+          </p:cNvSpPr>
+          <p:nvPr>
+            <p:ph type="title"/>
+          </p:nvPr>
+        </p:nvSpPr>
+        <p:spPr/>
+        <p:txBody>
+          <a:bodyPr/>
+          <a:lstStyle/>
+          <a:p>
+            <a:r>
+              <a:rPr lang="en-150" dirty="0"/>
+              <a:t>E</a:t>
+            </a:r>
+            <a:r>
+              <a:rPr lang="fr-BE" dirty="0"/>
+              <a:t>x</a:t>
+            </a:r>
+            <a:r>
+              <a:rPr lang="en-150" dirty="0"/>
+              <a:t>e</a:t>
+            </a:r>
+            <a:r>
+              <a:rPr lang="fr-BE" dirty="0"/>
+              <a:t>r</a:t>
+            </a:r>
+            <a:r>
+              <a:rPr lang="en-150" dirty="0"/>
+              <a:t>c</a:t>
+            </a:r>
+            <a:r>
+              <a:rPr lang="fr-BE" dirty="0"/>
+              <a:t>i</a:t>
+            </a:r>
+            <a:r>
+              <a:rPr lang="en-150" dirty="0"/>
+              <a:t>c</a:t>
+            </a:r>
+            <a:r>
+              <a:rPr lang="fr-BE" dirty="0"/>
+              <a:t>e</a:t>
+            </a:r>
+            <a:r>
+              <a:rPr lang="en-150" dirty="0"/>
+              <a:t> 3</a:t>
+            </a:r>
+            <a:endParaRPr lang="fr-BE" dirty="0"/>
+          </a:p>
+        </p:txBody>
+      </p:sp>
+      <p:sp>
+        <p:nvSpPr>
+          <p:cNvPr id="3" name="Espace réservé du contenu 2">
+            <a:extLst>
+              <a:ext uri="{FF2B5EF4-FFF2-40B4-BE49-F238E27FC236}">
+                <a16:creationId xmlns:a16="http://schemas.microsoft.com/office/drawing/2014/main" id="{2809FA2C-7F1C-4D9B-83FA-DC1D0EF82BE8}"/>
+              </a:ext>
+            </a:extLst>
+          </p:cNvPr>
+          <p:cNvSpPr>
+            <a:spLocks noGrp="1"/>
+          </p:cNvSpPr>
+          <p:nvPr>
+            <p:ph idx="1"/>
+          </p:nvPr>
+        </p:nvSpPr>
+        <p:spPr/>
+        <p:txBody>
+          <a:bodyPr/>
+          <a:lstStyle/>
+          <a:p>
+            <a:r>
+              <a:rPr lang="en-150" dirty="0"/>
+              <a:t>F</a:t>
+            </a:r>
+            <a:r>
+              <a:rPr lang="fr-BE" dirty="0"/>
+              <a:t>o</a:t>
+            </a:r>
+            <a:r>
+              <a:rPr lang="en-150" dirty="0"/>
+              <a:t>n</a:t>
+            </a:r>
+            <a:r>
+              <a:rPr lang="fr-BE" dirty="0"/>
+              <a:t>c</a:t>
+            </a:r>
+            <a:r>
+              <a:rPr lang="en-150" dirty="0"/>
+              <a:t>t</a:t>
+            </a:r>
+            <a:r>
+              <a:rPr lang="fr-BE" dirty="0"/>
+              <a:t>i</a:t>
+            </a:r>
+            <a:r>
+              <a:rPr lang="en-150" dirty="0"/>
+              <a:t>o</a:t>
+            </a:r>
+            <a:r>
+              <a:rPr lang="fr-BE" dirty="0"/>
+              <a:t>n</a:t>
+            </a:r>
+            <a:r>
+              <a:rPr lang="en-150" dirty="0"/>
+              <a:t>s</a:t>
+            </a:r>
+            <a:endParaRPr lang="fr-BE" dirty="0"/>
+          </a:p>
+        </p:txBody>
+      </p:sp>
+    </p:spTree>
+    <p:extLst>
+      <p:ext uri="{BB962C8B-B14F-4D97-AF65-F5344CB8AC3E}">
+        <p14:creationId xmlns:p14="http://schemas.microsoft.com/office/powerpoint/2010/main" val="36872158"/>
+      </p:ext>
+    </p:extLst>
+  </p:cSld>
+  <p:clrMapOvr>
+    <a:masterClrMapping/>
+  </p:clrMapOvr>
+</p:sld>
+</file>
+
+<file path=ppt/slides/slide22.xml><?xml version="1.0" encoding="utf-8"?>
+<p:sld xmlns:a="http://schemas.openxmlformats.org/drawingml/2006/main" xmlns:r="http://schemas.openxmlformats.org/officeDocument/2006/relationships" xmlns:p="http://schemas.openxmlformats.org/presentationml/2006/main">
+  <p:cSld>
+    <p:spTree>
+      <p:nvGrpSpPr>
+        <p:cNvPr id="1" name=""/>
+        <p:cNvGrpSpPr/>
+        <p:nvPr/>
+      </p:nvGrpSpPr>
+      <p:grpSpPr>
+        <a:xfrm>
+          <a:off x="0" y="0"/>
+          <a:ext cx="0" cy="0"/>
+          <a:chOff x="0" y="0"/>
+          <a:chExt cx="0" cy="0"/>
+        </a:xfrm>
+      </p:grpSpPr>
+      <p:sp>
+        <p:nvSpPr>
           <p:cNvPr id="4" name="Titre 3">
             <a:extLst>
               <a:ext uri="{FF2B5EF4-FFF2-40B4-BE49-F238E27FC236}">
@@ -7542,7 +7855,7 @@
 </p:sld>
 </file>
 
-<file path=ppt/slides/slide22.xml><?xml version="1.0" encoding="utf-8"?>
+<file path=ppt/slides/slide23.xml><?xml version="1.0" encoding="utf-8"?>
 <p:sld xmlns:a="http://schemas.openxmlformats.org/drawingml/2006/main" xmlns:r="http://schemas.openxmlformats.org/officeDocument/2006/relationships" xmlns:p="http://schemas.openxmlformats.org/presentationml/2006/main">
   <p:cSld>
     <p:spTree>
@@ -8727,587 +9040,6 @@
 </p:sld>
 </file>
 
-<file path=ppt/slides/slide23.xml><?xml version="1.0" encoding="utf-8"?>
-<p:sld xmlns:a="http://schemas.openxmlformats.org/drawingml/2006/main" xmlns:r="http://schemas.openxmlformats.org/officeDocument/2006/relationships" xmlns:p="http://schemas.openxmlformats.org/presentationml/2006/main">
-  <p:cSld>
-    <p:spTree>
-      <p:nvGrpSpPr>
-        <p:cNvPr id="1" name=""/>
-        <p:cNvGrpSpPr/>
-        <p:nvPr/>
-      </p:nvGrpSpPr>
-      <p:grpSpPr>
-        <a:xfrm>
-          <a:off x="0" y="0"/>
-          <a:ext cx="0" cy="0"/>
-          <a:chOff x="0" y="0"/>
-          <a:chExt cx="0" cy="0"/>
-        </a:xfrm>
-      </p:grpSpPr>
-      <p:sp>
-        <p:nvSpPr>
-          <p:cNvPr id="2" name="Titre 1">
-            <a:extLst>
-              <a:ext uri="{FF2B5EF4-FFF2-40B4-BE49-F238E27FC236}">
-                <a16:creationId xmlns:a16="http://schemas.microsoft.com/office/drawing/2014/main" id="{834372B4-33DC-4F47-8E09-3C2879443338}"/>
-              </a:ext>
-            </a:extLst>
-          </p:cNvPr>
-          <p:cNvSpPr>
-            <a:spLocks noGrp="1"/>
-          </p:cNvSpPr>
-          <p:nvPr>
-            <p:ph type="title"/>
-          </p:nvPr>
-        </p:nvSpPr>
-        <p:spPr/>
-        <p:txBody>
-          <a:bodyPr/>
-          <a:lstStyle/>
-          <a:p>
-            <a:r>
-              <a:rPr lang="fr-BE" dirty="0"/>
-              <a:t>S</a:t>
-            </a:r>
-            <a:r>
-              <a:rPr lang="en-150" dirty="0" err="1"/>
-              <a:t>tring</a:t>
-            </a:r>
-            <a:endParaRPr lang="fr-BE" dirty="0"/>
-          </a:p>
-        </p:txBody>
-      </p:sp>
-      <p:sp>
-        <p:nvSpPr>
-          <p:cNvPr id="3" name="Espace réservé du contenu 2">
-            <a:extLst>
-              <a:ext uri="{FF2B5EF4-FFF2-40B4-BE49-F238E27FC236}">
-                <a16:creationId xmlns:a16="http://schemas.microsoft.com/office/drawing/2014/main" id="{42425188-2AE9-4651-AD75-7785ED01846B}"/>
-              </a:ext>
-            </a:extLst>
-          </p:cNvPr>
-          <p:cNvSpPr>
-            <a:spLocks noGrp="1"/>
-          </p:cNvSpPr>
-          <p:nvPr>
-            <p:ph idx="1"/>
-          </p:nvPr>
-        </p:nvSpPr>
-        <p:spPr/>
-        <p:txBody>
-          <a:bodyPr>
-            <a:normAutofit fontScale="92500" lnSpcReduction="10000"/>
-          </a:bodyPr>
-          <a:lstStyle/>
-          <a:p>
-            <a:r>
-              <a:rPr lang="en-150" dirty="0">
-                <a:latin typeface="Consolas" panose="020B0609020204030204" pitchFamily="49" charset="0"/>
-              </a:rPr>
-              <a:t>m</a:t>
-            </a:r>
-            <a:r>
-              <a:rPr lang="fr-BE" dirty="0">
-                <a:latin typeface="Consolas" panose="020B0609020204030204" pitchFamily="49" charset="0"/>
-              </a:rPr>
-              <a:t>y</a:t>
-            </a:r>
-            <a:r>
-              <a:rPr lang="en-150" dirty="0">
-                <a:latin typeface="Consolas" panose="020B0609020204030204" pitchFamily="49" charset="0"/>
-              </a:rPr>
-              <a:t>_</a:t>
-            </a:r>
-            <a:r>
-              <a:rPr lang="fr-BE" dirty="0">
-                <a:latin typeface="Consolas" panose="020B0609020204030204" pitchFamily="49" charset="0"/>
-              </a:rPr>
-              <a:t>s</a:t>
-            </a:r>
-            <a:r>
-              <a:rPr lang="en-150" dirty="0">
-                <a:latin typeface="Consolas" panose="020B0609020204030204" pitchFamily="49" charset="0"/>
-              </a:rPr>
-              <a:t>t</a:t>
-            </a:r>
-            <a:r>
-              <a:rPr lang="fr-BE" dirty="0">
-                <a:latin typeface="Consolas" panose="020B0609020204030204" pitchFamily="49" charset="0"/>
-              </a:rPr>
-              <a:t>r</a:t>
-            </a:r>
-            <a:r>
-              <a:rPr lang="en-150" dirty="0" err="1">
-                <a:latin typeface="Consolas" panose="020B0609020204030204" pitchFamily="49" charset="0"/>
-              </a:rPr>
-              <a:t>i</a:t>
-            </a:r>
-            <a:r>
-              <a:rPr lang="fr-BE" dirty="0">
-                <a:latin typeface="Consolas" panose="020B0609020204030204" pitchFamily="49" charset="0"/>
-              </a:rPr>
-              <a:t>n</a:t>
-            </a:r>
-            <a:r>
-              <a:rPr lang="en-150" dirty="0">
-                <a:latin typeface="Consolas" panose="020B0609020204030204" pitchFamily="49" charset="0"/>
-              </a:rPr>
-              <a:t>g = "</a:t>
-            </a:r>
-            <a:r>
-              <a:rPr lang="fr-BE" dirty="0">
-                <a:latin typeface="Consolas" panose="020B0609020204030204" pitchFamily="49" charset="0"/>
-              </a:rPr>
-              <a:t>H</a:t>
-            </a:r>
-            <a:r>
-              <a:rPr lang="en-150" dirty="0">
-                <a:latin typeface="Consolas" panose="020B0609020204030204" pitchFamily="49" charset="0"/>
-              </a:rPr>
-              <a:t>e</a:t>
-            </a:r>
-            <a:r>
-              <a:rPr lang="fr-BE" dirty="0">
-                <a:latin typeface="Consolas" panose="020B0609020204030204" pitchFamily="49" charset="0"/>
-              </a:rPr>
-              <a:t>l</a:t>
-            </a:r>
-            <a:r>
-              <a:rPr lang="en-150" dirty="0">
-                <a:latin typeface="Consolas" panose="020B0609020204030204" pitchFamily="49" charset="0"/>
-              </a:rPr>
-              <a:t>l</a:t>
-            </a:r>
-            <a:r>
-              <a:rPr lang="fr-BE" dirty="0">
-                <a:latin typeface="Consolas" panose="020B0609020204030204" pitchFamily="49" charset="0"/>
-              </a:rPr>
-              <a:t>o</a:t>
-            </a:r>
-            <a:r>
-              <a:rPr lang="en-150" dirty="0">
-                <a:latin typeface="Consolas" panose="020B0609020204030204" pitchFamily="49" charset="0"/>
-              </a:rPr>
-              <a:t> </a:t>
-            </a:r>
-            <a:r>
-              <a:rPr lang="fr-BE" dirty="0">
-                <a:latin typeface="Consolas" panose="020B0609020204030204" pitchFamily="49" charset="0"/>
-              </a:rPr>
-              <a:t>W</a:t>
-            </a:r>
-            <a:r>
-              <a:rPr lang="en-150" dirty="0">
-                <a:latin typeface="Consolas" panose="020B0609020204030204" pitchFamily="49" charset="0"/>
-              </a:rPr>
-              <a:t>o</a:t>
-            </a:r>
-            <a:r>
-              <a:rPr lang="fr-BE" dirty="0">
-                <a:latin typeface="Consolas" panose="020B0609020204030204" pitchFamily="49" charset="0"/>
-              </a:rPr>
-              <a:t>r</a:t>
-            </a:r>
-            <a:r>
-              <a:rPr lang="en-150" dirty="0" err="1">
-                <a:latin typeface="Consolas" panose="020B0609020204030204" pitchFamily="49" charset="0"/>
-              </a:rPr>
-              <a:t>ld</a:t>
-            </a:r>
-            <a:r>
-              <a:rPr lang="en-150" dirty="0">
-                <a:latin typeface="Consolas" panose="020B0609020204030204" pitchFamily="49" charset="0"/>
-              </a:rPr>
-              <a:t>!"</a:t>
-            </a:r>
-          </a:p>
-          <a:p>
-            <a:r>
-              <a:rPr lang="en-150" dirty="0" err="1">
-                <a:latin typeface="Consolas" panose="020B0609020204030204" pitchFamily="49" charset="0"/>
-              </a:rPr>
-              <a:t>len</a:t>
-            </a:r>
-            <a:r>
-              <a:rPr lang="en-150" dirty="0">
-                <a:latin typeface="Consolas" panose="020B0609020204030204" pitchFamily="49" charset="0"/>
-              </a:rPr>
-              <a:t>(</a:t>
-            </a:r>
-            <a:r>
-              <a:rPr lang="en-150" dirty="0" err="1">
-                <a:latin typeface="Consolas" panose="020B0609020204030204" pitchFamily="49" charset="0"/>
-              </a:rPr>
-              <a:t>my_string</a:t>
-            </a:r>
-            <a:r>
-              <a:rPr lang="en-150" dirty="0">
-                <a:latin typeface="Consolas" panose="020B0609020204030204" pitchFamily="49" charset="0"/>
-              </a:rPr>
-              <a:t>)</a:t>
-            </a:r>
-          </a:p>
-          <a:p>
-            <a:r>
-              <a:rPr lang="en-150" dirty="0" err="1">
-                <a:latin typeface="Consolas" panose="020B0609020204030204" pitchFamily="49" charset="0"/>
-              </a:rPr>
-              <a:t>my_long_string</a:t>
-            </a:r>
-            <a:r>
-              <a:rPr lang="en-150" dirty="0">
-                <a:latin typeface="Consolas" panose="020B0609020204030204" pitchFamily="49" charset="0"/>
-              </a:rPr>
-              <a:t> = """Today I've got many thing</a:t>
-            </a:r>
-            <a:r>
-              <a:rPr lang="fr-BE" dirty="0">
-                <a:latin typeface="Consolas" panose="020B0609020204030204" pitchFamily="49" charset="0"/>
-              </a:rPr>
-              <a:t>s</a:t>
-            </a:r>
-            <a:endParaRPr lang="en-150" dirty="0">
-              <a:latin typeface="Consolas" panose="020B0609020204030204" pitchFamily="49" charset="0"/>
-            </a:endParaRPr>
-          </a:p>
-          <a:p>
-            <a:r>
-              <a:rPr lang="en-150" dirty="0">
-                <a:latin typeface="Consolas" panose="020B0609020204030204" pitchFamily="49" charset="0"/>
-              </a:rPr>
-              <a:t>to say."""</a:t>
-            </a:r>
-          </a:p>
-          <a:p>
-            <a:r>
-              <a:rPr lang="en-150" dirty="0">
-                <a:latin typeface="Consolas" panose="020B0609020204030204" pitchFamily="49" charset="0"/>
-              </a:rPr>
-              <a:t>p</a:t>
-            </a:r>
-            <a:r>
-              <a:rPr lang="fr-BE" dirty="0">
-                <a:latin typeface="Consolas" panose="020B0609020204030204" pitchFamily="49" charset="0"/>
-              </a:rPr>
-              <a:t>r</a:t>
-            </a:r>
-            <a:r>
-              <a:rPr lang="en-150" dirty="0" err="1">
-                <a:latin typeface="Consolas" panose="020B0609020204030204" pitchFamily="49" charset="0"/>
-              </a:rPr>
-              <a:t>i</a:t>
-            </a:r>
-            <a:r>
-              <a:rPr lang="fr-BE" dirty="0">
-                <a:latin typeface="Consolas" panose="020B0609020204030204" pitchFamily="49" charset="0"/>
-              </a:rPr>
-              <a:t>n</a:t>
-            </a:r>
-            <a:r>
-              <a:rPr lang="en-150" dirty="0">
-                <a:latin typeface="Consolas" panose="020B0609020204030204" pitchFamily="49" charset="0"/>
-              </a:rPr>
-              <a:t>t(</a:t>
-            </a:r>
-            <a:r>
-              <a:rPr lang="fr-BE" dirty="0">
-                <a:latin typeface="Consolas" panose="020B0609020204030204" pitchFamily="49" charset="0"/>
-              </a:rPr>
-              <a:t>m</a:t>
-            </a:r>
-            <a:r>
-              <a:rPr lang="en-150" dirty="0">
-                <a:latin typeface="Consolas" panose="020B0609020204030204" pitchFamily="49" charset="0"/>
-              </a:rPr>
-              <a:t>y_</a:t>
-            </a:r>
-            <a:r>
-              <a:rPr lang="fr-BE" dirty="0">
-                <a:latin typeface="Consolas" panose="020B0609020204030204" pitchFamily="49" charset="0"/>
-              </a:rPr>
-              <a:t>s</a:t>
-            </a:r>
-            <a:r>
-              <a:rPr lang="en-150" dirty="0">
-                <a:latin typeface="Consolas" panose="020B0609020204030204" pitchFamily="49" charset="0"/>
-              </a:rPr>
-              <a:t>t</a:t>
-            </a:r>
-            <a:r>
-              <a:rPr lang="fr-BE" dirty="0">
-                <a:latin typeface="Consolas" panose="020B0609020204030204" pitchFamily="49" charset="0"/>
-              </a:rPr>
-              <a:t>r</a:t>
-            </a:r>
-            <a:r>
-              <a:rPr lang="en-150" dirty="0" err="1">
-                <a:latin typeface="Consolas" panose="020B0609020204030204" pitchFamily="49" charset="0"/>
-              </a:rPr>
-              <a:t>i</a:t>
-            </a:r>
-            <a:r>
-              <a:rPr lang="fr-BE" dirty="0">
-                <a:latin typeface="Consolas" panose="020B0609020204030204" pitchFamily="49" charset="0"/>
-              </a:rPr>
-              <a:t>n</a:t>
-            </a:r>
-            <a:r>
-              <a:rPr lang="en-150" dirty="0">
-                <a:latin typeface="Consolas" panose="020B0609020204030204" pitchFamily="49" charset="0"/>
-              </a:rPr>
-              <a:t>g + </a:t>
-            </a:r>
-            <a:r>
-              <a:rPr lang="fr-BE" dirty="0">
-                <a:latin typeface="Consolas" panose="020B0609020204030204" pitchFamily="49" charset="0"/>
-              </a:rPr>
-              <a:t>m</a:t>
-            </a:r>
-            <a:r>
-              <a:rPr lang="en-150" dirty="0">
-                <a:latin typeface="Consolas" panose="020B0609020204030204" pitchFamily="49" charset="0"/>
-              </a:rPr>
-              <a:t>y_</a:t>
-            </a:r>
-            <a:r>
-              <a:rPr lang="fr-BE" dirty="0">
-                <a:latin typeface="Consolas" panose="020B0609020204030204" pitchFamily="49" charset="0"/>
-              </a:rPr>
-              <a:t>l</a:t>
-            </a:r>
-            <a:r>
-              <a:rPr lang="en-150" dirty="0">
-                <a:latin typeface="Consolas" panose="020B0609020204030204" pitchFamily="49" charset="0"/>
-              </a:rPr>
-              <a:t>o</a:t>
-            </a:r>
-            <a:r>
-              <a:rPr lang="fr-BE" dirty="0">
-                <a:latin typeface="Consolas" panose="020B0609020204030204" pitchFamily="49" charset="0"/>
-              </a:rPr>
-              <a:t>n</a:t>
-            </a:r>
-            <a:r>
-              <a:rPr lang="en-150" dirty="0">
-                <a:latin typeface="Consolas" panose="020B0609020204030204" pitchFamily="49" charset="0"/>
-              </a:rPr>
-              <a:t>g_</a:t>
-            </a:r>
-            <a:r>
-              <a:rPr lang="fr-BE" dirty="0">
-                <a:latin typeface="Consolas" panose="020B0609020204030204" pitchFamily="49" charset="0"/>
-              </a:rPr>
-              <a:t>s</a:t>
-            </a:r>
-            <a:r>
-              <a:rPr lang="en-150" dirty="0">
-                <a:latin typeface="Consolas" panose="020B0609020204030204" pitchFamily="49" charset="0"/>
-              </a:rPr>
-              <a:t>t</a:t>
-            </a:r>
-            <a:r>
-              <a:rPr lang="fr-BE" dirty="0">
-                <a:latin typeface="Consolas" panose="020B0609020204030204" pitchFamily="49" charset="0"/>
-              </a:rPr>
-              <a:t>r</a:t>
-            </a:r>
-            <a:r>
-              <a:rPr lang="en-150" dirty="0" err="1">
-                <a:latin typeface="Consolas" panose="020B0609020204030204" pitchFamily="49" charset="0"/>
-              </a:rPr>
-              <a:t>i</a:t>
-            </a:r>
-            <a:r>
-              <a:rPr lang="fr-BE" dirty="0">
-                <a:latin typeface="Consolas" panose="020B0609020204030204" pitchFamily="49" charset="0"/>
-              </a:rPr>
-              <a:t>n</a:t>
-            </a:r>
-            <a:r>
-              <a:rPr lang="en-150" dirty="0">
-                <a:latin typeface="Consolas" panose="020B0609020204030204" pitchFamily="49" charset="0"/>
-              </a:rPr>
-              <a:t>g)</a:t>
-            </a:r>
-          </a:p>
-          <a:p>
-            <a:r>
-              <a:rPr lang="en-150" dirty="0" err="1">
-                <a:latin typeface="Consolas" panose="020B0609020204030204" pitchFamily="49" charset="0"/>
-              </a:rPr>
-              <a:t>my_string</a:t>
-            </a:r>
-            <a:r>
-              <a:rPr lang="en-150" dirty="0">
-                <a:latin typeface="Consolas" panose="020B0609020204030204" pitchFamily="49" charset="0"/>
-              </a:rPr>
-              <a:t>[0]</a:t>
-            </a:r>
-          </a:p>
-          <a:p>
-            <a:r>
-              <a:rPr lang="en-150" dirty="0" err="1">
-                <a:latin typeface="Consolas" panose="020B0609020204030204" pitchFamily="49" charset="0"/>
-              </a:rPr>
-              <a:t>my_string</a:t>
-            </a:r>
-            <a:r>
-              <a:rPr lang="en-150" dirty="0">
-                <a:latin typeface="Consolas" panose="020B0609020204030204" pitchFamily="49" charset="0"/>
-              </a:rPr>
-              <a:t>[0:5]</a:t>
-            </a:r>
-          </a:p>
-          <a:p>
-            <a:r>
-              <a:rPr lang="en-150" dirty="0" err="1">
-                <a:latin typeface="Consolas" panose="020B0609020204030204" pitchFamily="49" charset="0"/>
-              </a:rPr>
-              <a:t>my_string</a:t>
-            </a:r>
-            <a:r>
-              <a:rPr lang="en-150" dirty="0">
-                <a:latin typeface="Consolas" panose="020B0609020204030204" pitchFamily="49" charset="0"/>
-              </a:rPr>
-              <a:t>[-1]</a:t>
-            </a:r>
-          </a:p>
-          <a:p>
-            <a:r>
-              <a:rPr lang="en-150" dirty="0" err="1">
-                <a:latin typeface="Consolas" panose="020B0609020204030204" pitchFamily="49" charset="0"/>
-              </a:rPr>
-              <a:t>my_string</a:t>
-            </a:r>
-            <a:r>
-              <a:rPr lang="en-150" dirty="0">
-                <a:latin typeface="Consolas" panose="020B0609020204030204" pitchFamily="49" charset="0"/>
-              </a:rPr>
-              <a:t>[6:11] = "</a:t>
-            </a:r>
-            <a:r>
-              <a:rPr lang="fr-BE" dirty="0">
-                <a:latin typeface="Consolas" panose="020B0609020204030204" pitchFamily="49" charset="0"/>
-              </a:rPr>
-              <a:t>m</a:t>
-            </a:r>
-            <a:r>
-              <a:rPr lang="en-150" dirty="0">
-                <a:latin typeface="Consolas" panose="020B0609020204030204" pitchFamily="49" charset="0"/>
-              </a:rPr>
-              <a:t>e"</a:t>
-            </a:r>
-          </a:p>
-          <a:p>
-            <a:r>
-              <a:rPr lang="en-150" dirty="0">
-                <a:latin typeface="Consolas" panose="020B0609020204030204" pitchFamily="49" charset="0"/>
-              </a:rPr>
-              <a:t>m</a:t>
-            </a:r>
-            <a:r>
-              <a:rPr lang="fr-BE" dirty="0">
-                <a:latin typeface="Consolas" panose="020B0609020204030204" pitchFamily="49" charset="0"/>
-              </a:rPr>
-              <a:t>y</a:t>
-            </a:r>
-            <a:r>
-              <a:rPr lang="en-150" dirty="0">
-                <a:latin typeface="Consolas" panose="020B0609020204030204" pitchFamily="49" charset="0"/>
-              </a:rPr>
-              <a:t>_</a:t>
-            </a:r>
-            <a:r>
-              <a:rPr lang="fr-BE" dirty="0">
-                <a:latin typeface="Consolas" panose="020B0609020204030204" pitchFamily="49" charset="0"/>
-              </a:rPr>
-              <a:t>s</a:t>
-            </a:r>
-            <a:r>
-              <a:rPr lang="en-150" dirty="0">
-                <a:latin typeface="Consolas" panose="020B0609020204030204" pitchFamily="49" charset="0"/>
-              </a:rPr>
-              <a:t>t</a:t>
-            </a:r>
-            <a:r>
-              <a:rPr lang="fr-BE" dirty="0">
-                <a:latin typeface="Consolas" panose="020B0609020204030204" pitchFamily="49" charset="0"/>
-              </a:rPr>
-              <a:t>r</a:t>
-            </a:r>
-            <a:r>
-              <a:rPr lang="en-150" dirty="0" err="1">
-                <a:latin typeface="Consolas" panose="020B0609020204030204" pitchFamily="49" charset="0"/>
-              </a:rPr>
-              <a:t>i</a:t>
-            </a:r>
-            <a:r>
-              <a:rPr lang="fr-BE" dirty="0">
-                <a:latin typeface="Consolas" panose="020B0609020204030204" pitchFamily="49" charset="0"/>
-              </a:rPr>
-              <a:t>n</a:t>
-            </a:r>
-            <a:r>
-              <a:rPr lang="en-150" dirty="0">
-                <a:latin typeface="Consolas" panose="020B0609020204030204" pitchFamily="49" charset="0"/>
-              </a:rPr>
-              <a:t>g.</a:t>
-            </a:r>
-            <a:r>
-              <a:rPr lang="fr-BE" dirty="0">
-                <a:latin typeface="Consolas" panose="020B0609020204030204" pitchFamily="49" charset="0"/>
-              </a:rPr>
-              <a:t>l</a:t>
-            </a:r>
-            <a:r>
-              <a:rPr lang="en-150" dirty="0">
-                <a:latin typeface="Consolas" panose="020B0609020204030204" pitchFamily="49" charset="0"/>
-              </a:rPr>
-              <a:t>o</a:t>
-            </a:r>
-            <a:r>
-              <a:rPr lang="fr-BE" dirty="0">
-                <a:latin typeface="Consolas" panose="020B0609020204030204" pitchFamily="49" charset="0"/>
-              </a:rPr>
-              <a:t>w</a:t>
-            </a:r>
-            <a:r>
-              <a:rPr lang="en-150" dirty="0">
-                <a:latin typeface="Consolas" panose="020B0609020204030204" pitchFamily="49" charset="0"/>
-              </a:rPr>
-              <a:t>e</a:t>
-            </a:r>
-            <a:r>
-              <a:rPr lang="fr-BE" dirty="0">
-                <a:latin typeface="Consolas" panose="020B0609020204030204" pitchFamily="49" charset="0"/>
-              </a:rPr>
-              <a:t>r</a:t>
-            </a:r>
-            <a:r>
-              <a:rPr lang="en-150" dirty="0">
-                <a:latin typeface="Consolas" panose="020B0609020204030204" pitchFamily="49" charset="0"/>
-              </a:rPr>
-              <a:t>()</a:t>
-            </a:r>
-            <a:endParaRPr lang="fr-BE" dirty="0">
-              <a:latin typeface="Consolas" panose="020B0609020204030204" pitchFamily="49" charset="0"/>
-            </a:endParaRPr>
-          </a:p>
-        </p:txBody>
-      </p:sp>
-    </p:spTree>
-    <p:extLst>
-      <p:ext uri="{BB962C8B-B14F-4D97-AF65-F5344CB8AC3E}">
-        <p14:creationId xmlns:p14="http://schemas.microsoft.com/office/powerpoint/2010/main" val="1218455973"/>
-      </p:ext>
-    </p:extLst>
-  </p:cSld>
-  <p:clrMapOvr>
-    <a:masterClrMapping/>
-  </p:clrMapOvr>
-</p:sld>
-</file>
-
 <file path=ppt/slides/slide24.xml><?xml version="1.0" encoding="utf-8"?>
 <p:sld xmlns:a="http://schemas.openxmlformats.org/drawingml/2006/main" xmlns:r="http://schemas.openxmlformats.org/officeDocument/2006/relationships" xmlns:p="http://schemas.openxmlformats.org/presentationml/2006/main">
   <p:cSld>
@@ -9348,59 +9080,11 @@
           <a:p>
             <a:r>
               <a:rPr lang="fr-BE" dirty="0"/>
-              <a:t>L</a:t>
+              <a:t>S</a:t>
             </a:r>
             <a:r>
               <a:rPr lang="en-150" dirty="0" err="1"/>
-              <a:t>i</a:t>
-            </a:r>
-            <a:r>
-              <a:rPr lang="fr-BE" dirty="0"/>
-              <a:t>s</a:t>
-            </a:r>
-            <a:r>
-              <a:rPr lang="en-150" dirty="0"/>
-              <a:t>t</a:t>
-            </a:r>
-            <a:r>
-              <a:rPr lang="fr-BE" dirty="0"/>
-              <a:t>e</a:t>
-            </a:r>
-            <a:r>
-              <a:rPr lang="en-150" dirty="0"/>
-              <a:t>s </a:t>
-            </a:r>
-            <a:r>
-              <a:rPr lang="fr-BE" dirty="0"/>
-              <a:t>e</a:t>
-            </a:r>
-            <a:r>
-              <a:rPr lang="en-150" dirty="0"/>
-              <a:t>t </a:t>
-            </a:r>
-            <a:r>
-              <a:rPr lang="fr-BE" dirty="0"/>
-              <a:t>t</a:t>
-            </a:r>
-            <a:r>
-              <a:rPr lang="en-150" dirty="0"/>
-              <a:t>u</a:t>
-            </a:r>
-            <a:r>
-              <a:rPr lang="fr-BE" dirty="0"/>
-              <a:t>p</a:t>
-            </a:r>
-            <a:r>
-              <a:rPr lang="en-150" dirty="0"/>
-              <a:t>l</a:t>
-            </a:r>
-            <a:r>
-              <a:rPr lang="fr-BE" dirty="0"/>
-              <a:t>e</a:t>
-            </a:r>
-            <a:r>
-              <a:rPr lang="en-150" dirty="0"/>
-              <a:t>s</a:t>
+              <a:t>tring</a:t>
             </a:r>
             <a:endParaRPr lang="fr-BE" dirty="0"/>
           </a:p>
@@ -9424,27 +9108,137 @@
         </p:nvSpPr>
         <p:spPr/>
         <p:txBody>
-          <a:bodyPr/>
+          <a:bodyPr>
+            <a:normAutofit fontScale="92500" lnSpcReduction="10000"/>
+          </a:bodyPr>
           <a:lstStyle/>
           <a:p>
             <a:r>
-              <a:rPr lang="fr-BE" dirty="0" err="1">
-                <a:latin typeface="Consolas" panose="020B0609020204030204" pitchFamily="49" charset="0"/>
-              </a:rPr>
-              <a:t>my_tuple</a:t>
-            </a:r>
-            <a:r>
               <a:rPr lang="en-150" dirty="0">
                 <a:latin typeface="Consolas" panose="020B0609020204030204" pitchFamily="49" charset="0"/>
               </a:rPr>
-              <a:t> = (0, 1, 2, 3)</a:t>
-            </a:r>
-          </a:p>
-          <a:p>
+              <a:t>m</a:t>
+            </a:r>
+            <a:r>
+              <a:rPr lang="fr-BE" dirty="0">
+                <a:latin typeface="Consolas" panose="020B0609020204030204" pitchFamily="49" charset="0"/>
+              </a:rPr>
+              <a:t>y</a:t>
+            </a:r>
+            <a:r>
+              <a:rPr lang="en-150" dirty="0">
+                <a:latin typeface="Consolas" panose="020B0609020204030204" pitchFamily="49" charset="0"/>
+              </a:rPr>
+              <a:t>_</a:t>
+            </a:r>
+            <a:r>
+              <a:rPr lang="fr-BE" dirty="0">
+                <a:latin typeface="Consolas" panose="020B0609020204030204" pitchFamily="49" charset="0"/>
+              </a:rPr>
+              <a:t>s</a:t>
+            </a:r>
+            <a:r>
+              <a:rPr lang="en-150" dirty="0">
+                <a:latin typeface="Consolas" panose="020B0609020204030204" pitchFamily="49" charset="0"/>
+              </a:rPr>
+              <a:t>t</a:t>
+            </a:r>
+            <a:r>
+              <a:rPr lang="fr-BE" dirty="0">
+                <a:latin typeface="Consolas" panose="020B0609020204030204" pitchFamily="49" charset="0"/>
+              </a:rPr>
+              <a:t>r</a:t>
+            </a:r>
             <a:r>
               <a:rPr lang="en-150" dirty="0" err="1">
                 <a:latin typeface="Consolas" panose="020B0609020204030204" pitchFamily="49" charset="0"/>
               </a:rPr>
+              <a:t>i</a:t>
+            </a:r>
+            <a:r>
+              <a:rPr lang="fr-BE" dirty="0">
+                <a:latin typeface="Consolas" panose="020B0609020204030204" pitchFamily="49" charset="0"/>
+              </a:rPr>
+              <a:t>n</a:t>
+            </a:r>
+            <a:r>
+              <a:rPr lang="en-150" dirty="0">
+                <a:latin typeface="Consolas" panose="020B0609020204030204" pitchFamily="49" charset="0"/>
+              </a:rPr>
+              <a:t>g = "</a:t>
+            </a:r>
+            <a:r>
+              <a:rPr lang="fr-BE" dirty="0">
+                <a:latin typeface="Consolas" panose="020B0609020204030204" pitchFamily="49" charset="0"/>
+              </a:rPr>
+              <a:t>H</a:t>
+            </a:r>
+            <a:r>
+              <a:rPr lang="en-150" dirty="0">
+                <a:latin typeface="Consolas" panose="020B0609020204030204" pitchFamily="49" charset="0"/>
+              </a:rPr>
+              <a:t>e</a:t>
+            </a:r>
+            <a:r>
+              <a:rPr lang="fr-BE" dirty="0">
+                <a:latin typeface="Consolas" panose="020B0609020204030204" pitchFamily="49" charset="0"/>
+              </a:rPr>
+              <a:t>l</a:t>
+            </a:r>
+            <a:r>
+              <a:rPr lang="en-150" dirty="0">
+                <a:latin typeface="Consolas" panose="020B0609020204030204" pitchFamily="49" charset="0"/>
+              </a:rPr>
+              <a:t>l</a:t>
+            </a:r>
+            <a:r>
+              <a:rPr lang="fr-BE" dirty="0">
+                <a:latin typeface="Consolas" panose="020B0609020204030204" pitchFamily="49" charset="0"/>
+              </a:rPr>
+              <a:t>o</a:t>
+            </a:r>
+            <a:r>
+              <a:rPr lang="en-150" dirty="0">
+                <a:latin typeface="Consolas" panose="020B0609020204030204" pitchFamily="49" charset="0"/>
+              </a:rPr>
+              <a:t> </a:t>
+            </a:r>
+            <a:r>
+              <a:rPr lang="fr-BE" dirty="0">
+                <a:latin typeface="Consolas" panose="020B0609020204030204" pitchFamily="49" charset="0"/>
+              </a:rPr>
+              <a:t>W</a:t>
+            </a:r>
+            <a:r>
+              <a:rPr lang="en-150" dirty="0">
+                <a:latin typeface="Consolas" panose="020B0609020204030204" pitchFamily="49" charset="0"/>
+              </a:rPr>
+              <a:t>o</a:t>
+            </a:r>
+            <a:r>
+              <a:rPr lang="fr-BE" dirty="0">
+                <a:latin typeface="Consolas" panose="020B0609020204030204" pitchFamily="49" charset="0"/>
+              </a:rPr>
+              <a:t>r</a:t>
+            </a:r>
+            <a:r>
+              <a:rPr lang="en-150" dirty="0" err="1">
+                <a:latin typeface="Consolas" panose="020B0609020204030204" pitchFamily="49" charset="0"/>
+              </a:rPr>
+              <a:t>ld</a:t>
+            </a:r>
+            <a:r>
+              <a:rPr lang="en-150" dirty="0">
+                <a:latin typeface="Consolas" panose="020B0609020204030204" pitchFamily="49" charset="0"/>
+              </a:rPr>
+              <a:t>!"</a:t>
+            </a:r>
+          </a:p>
+          <a:p>
+            <a:r>
+              <a:rPr lang="en-150" dirty="0" err="1">
+                <a:latin typeface="Consolas" panose="020B0609020204030204" pitchFamily="49" charset="0"/>
+              </a:rPr>
               <a:t>len</a:t>
             </a:r>
             <a:r>
@@ -9454,10 +9248,10 @@
               <a:t>(</a:t>
             </a:r>
             <a:r>
-              <a:rPr lang="fr-BE" dirty="0" err="1">
-                <a:latin typeface="Consolas" panose="020B0609020204030204" pitchFamily="49" charset="0"/>
-              </a:rPr>
-              <a:t>my_tuple</a:t>
+              <a:rPr lang="en-150" dirty="0" err="1">
+                <a:latin typeface="Consolas" panose="020B0609020204030204" pitchFamily="49" charset="0"/>
+              </a:rPr>
+              <a:t>my_string</a:t>
             </a:r>
             <a:r>
               <a:rPr lang="en-150" dirty="0">
@@ -9468,64 +9262,345 @@
           </a:p>
           <a:p>
             <a:r>
-              <a:rPr lang="fr-BE" dirty="0" err="1">
-                <a:latin typeface="Consolas" panose="020B0609020204030204" pitchFamily="49" charset="0"/>
-              </a:rPr>
-              <a:t>my_tuple</a:t>
+              <a:rPr lang="en-150" dirty="0" err="1">
+                <a:latin typeface="Consolas" panose="020B0609020204030204" pitchFamily="49" charset="0"/>
+              </a:rPr>
+              <a:t>my_long_string</a:t>
             </a:r>
             <a:r>
               <a:rPr lang="en-150" dirty="0">
                 <a:latin typeface="Consolas" panose="020B0609020204030204" pitchFamily="49" charset="0"/>
               </a:rPr>
-              <a:t>[2]</a:t>
-            </a:r>
-          </a:p>
-          <a:p>
-            <a:r>
-              <a:rPr lang="fr-BE" dirty="0" err="1">
-                <a:latin typeface="Consolas" panose="020B0609020204030204" pitchFamily="49" charset="0"/>
-              </a:rPr>
-              <a:t>my_tuple</a:t>
-            </a:r>
+              <a:t> = """Today I've got many thing</a:t>
+            </a:r>
+            <a:r>
+              <a:rPr lang="fr-BE" dirty="0">
+                <a:latin typeface="Consolas" panose="020B0609020204030204" pitchFamily="49" charset="0"/>
+              </a:rPr>
+              <a:t>s</a:t>
+            </a:r>
+            <a:endParaRPr lang="en-150" dirty="0">
+              <a:latin typeface="Consolas" panose="020B0609020204030204" pitchFamily="49" charset="0"/>
+            </a:endParaRPr>
+          </a:p>
+          <a:p>
             <a:r>
               <a:rPr lang="en-150" dirty="0">
                 <a:latin typeface="Consolas" panose="020B0609020204030204" pitchFamily="49" charset="0"/>
               </a:rPr>
-              <a:t>[0:2]</a:t>
-            </a:r>
-          </a:p>
-          <a:p>
-            <a:r>
-              <a:rPr lang="fr-BE" dirty="0" err="1">
-                <a:latin typeface="Consolas" panose="020B0609020204030204" pitchFamily="49" charset="0"/>
-              </a:rPr>
-              <a:t>my_tuple</a:t>
-            </a:r>
+              <a:t>to say."""</a:t>
+            </a:r>
+          </a:p>
+          <a:p>
             <a:r>
               <a:rPr lang="en-150" dirty="0">
                 <a:latin typeface="Consolas" panose="020B0609020204030204" pitchFamily="49" charset="0"/>
               </a:rPr>
-              <a:t>[-2]</a:t>
-            </a:r>
-          </a:p>
-          <a:p>
+              <a:t>p</a:t>
+            </a:r>
+            <a:r>
+              <a:rPr lang="fr-BE" dirty="0">
+                <a:latin typeface="Consolas" panose="020B0609020204030204" pitchFamily="49" charset="0"/>
+              </a:rPr>
+              <a:t>r</a:t>
+            </a:r>
+            <a:r>
+              <a:rPr lang="en-150" dirty="0" err="1">
+                <a:latin typeface="Consolas" panose="020B0609020204030204" pitchFamily="49" charset="0"/>
+              </a:rPr>
+              <a:t>i</a:t>
+            </a:r>
+            <a:r>
+              <a:rPr lang="fr-BE" dirty="0">
+                <a:latin typeface="Consolas" panose="020B0609020204030204" pitchFamily="49" charset="0"/>
+              </a:rPr>
+              <a:t>n</a:t>
+            </a:r>
             <a:r>
               <a:rPr lang="en-150" dirty="0">
                 <a:latin typeface="Consolas" panose="020B0609020204030204" pitchFamily="49" charset="0"/>
               </a:rPr>
-              <a:t>min(</a:t>
-            </a:r>
-            <a:r>
-              <a:rPr lang="fr-BE" dirty="0" err="1">
-                <a:latin typeface="Consolas" panose="020B0609020204030204" pitchFamily="49" charset="0"/>
-              </a:rPr>
-              <a:t>my_tuple</a:t>
+              <a:t>t(</a:t>
+            </a:r>
+            <a:r>
+              <a:rPr lang="fr-BE" dirty="0">
+                <a:latin typeface="Consolas" panose="020B0609020204030204" pitchFamily="49" charset="0"/>
+              </a:rPr>
+              <a:t>m</a:t>
             </a:r>
             <a:r>
               <a:rPr lang="en-150" dirty="0">
                 <a:latin typeface="Consolas" panose="020B0609020204030204" pitchFamily="49" charset="0"/>
               </a:rPr>
-              <a:t>)</a:t>
+              <a:t>y_</a:t>
+            </a:r>
+            <a:r>
+              <a:rPr lang="fr-BE" dirty="0">
+                <a:latin typeface="Consolas" panose="020B0609020204030204" pitchFamily="49" charset="0"/>
+              </a:rPr>
+              <a:t>s</a:t>
+            </a:r>
+            <a:r>
+              <a:rPr lang="en-150" dirty="0">
+                <a:latin typeface="Consolas" panose="020B0609020204030204" pitchFamily="49" charset="0"/>
+              </a:rPr>
+              <a:t>t</a:t>
+            </a:r>
+            <a:r>
+              <a:rPr lang="fr-BE" dirty="0">
+                <a:latin typeface="Consolas" panose="020B0609020204030204" pitchFamily="49" charset="0"/>
+              </a:rPr>
+              <a:t>r</a:t>
+            </a:r>
+            <a:r>
+              <a:rPr lang="en-150" dirty="0" err="1">
+                <a:latin typeface="Consolas" panose="020B0609020204030204" pitchFamily="49" charset="0"/>
+              </a:rPr>
+              <a:t>i</a:t>
+            </a:r>
+            <a:r>
+              <a:rPr lang="fr-BE" dirty="0">
+                <a:latin typeface="Consolas" panose="020B0609020204030204" pitchFamily="49" charset="0"/>
+              </a:rPr>
+              <a:t>n</a:t>
+            </a:r>
+            <a:r>
+              <a:rPr lang="en-150" dirty="0">
+                <a:latin typeface="Consolas" panose="020B0609020204030204" pitchFamily="49" charset="0"/>
+              </a:rPr>
+              <a:t>g + </a:t>
+            </a:r>
+            <a:r>
+              <a:rPr lang="fr-BE" dirty="0">
+                <a:latin typeface="Consolas" panose="020B0609020204030204" pitchFamily="49" charset="0"/>
+              </a:rPr>
+              <a:t>m</a:t>
+            </a:r>
+            <a:r>
+              <a:rPr lang="en-150" dirty="0">
+                <a:latin typeface="Consolas" panose="020B0609020204030204" pitchFamily="49" charset="0"/>
+              </a:rPr>
+              <a:t>y_</a:t>
+            </a:r>
+            <a:r>
+              <a:rPr lang="fr-BE" dirty="0">
+                <a:latin typeface="Consolas" panose="020B0609020204030204" pitchFamily="49" charset="0"/>
+              </a:rPr>
+              <a:t>l</a:t>
+            </a:r>
+            <a:r>
+              <a:rPr lang="en-150" dirty="0">
+                <a:latin typeface="Consolas" panose="020B0609020204030204" pitchFamily="49" charset="0"/>
+              </a:rPr>
+              <a:t>o</a:t>
+            </a:r>
+            <a:r>
+              <a:rPr lang="fr-BE" dirty="0">
+                <a:latin typeface="Consolas" panose="020B0609020204030204" pitchFamily="49" charset="0"/>
+              </a:rPr>
+              <a:t>n</a:t>
+            </a:r>
+            <a:r>
+              <a:rPr lang="en-150" dirty="0">
+                <a:latin typeface="Consolas" panose="020B0609020204030204" pitchFamily="49" charset="0"/>
+              </a:rPr>
+              <a:t>g_</a:t>
+            </a:r>
+            <a:r>
+              <a:rPr lang="fr-BE" dirty="0">
+                <a:latin typeface="Consolas" panose="020B0609020204030204" pitchFamily="49" charset="0"/>
+              </a:rPr>
+              <a:t>s</a:t>
+            </a:r>
+            <a:r>
+              <a:rPr lang="en-150" dirty="0">
+                <a:latin typeface="Consolas" panose="020B0609020204030204" pitchFamily="49" charset="0"/>
+              </a:rPr>
+              <a:t>t</a:t>
+            </a:r>
+            <a:r>
+              <a:rPr lang="fr-BE" dirty="0">
+                <a:latin typeface="Consolas" panose="020B0609020204030204" pitchFamily="49" charset="0"/>
+              </a:rPr>
+              <a:t>r</a:t>
+            </a:r>
+            <a:r>
+              <a:rPr lang="en-150" dirty="0" err="1">
+                <a:latin typeface="Consolas" panose="020B0609020204030204" pitchFamily="49" charset="0"/>
+              </a:rPr>
+              <a:t>i</a:t>
+            </a:r>
+            <a:r>
+              <a:rPr lang="fr-BE" dirty="0">
+                <a:latin typeface="Consolas" panose="020B0609020204030204" pitchFamily="49" charset="0"/>
+              </a:rPr>
+              <a:t>n</a:t>
+            </a:r>
+            <a:r>
+              <a:rPr lang="en-150" dirty="0">
+                <a:latin typeface="Consolas" panose="020B0609020204030204" pitchFamily="49" charset="0"/>
+              </a:rPr>
+              <a:t>g)</a:t>
+            </a:r>
+          </a:p>
+          <a:p>
+            <a:r>
+              <a:rPr lang="en-150" dirty="0" err="1">
+                <a:latin typeface="Consolas" panose="020B0609020204030204" pitchFamily="49" charset="0"/>
+              </a:rPr>
+              <a:t>my_string</a:t>
+            </a:r>
+            <a:r>
+              <a:rPr lang="en-150" dirty="0">
+                <a:latin typeface="Consolas" panose="020B0609020204030204" pitchFamily="49" charset="0"/>
+              </a:rPr>
+              <a:t>[0]</a:t>
+            </a:r>
+          </a:p>
+          <a:p>
+            <a:r>
+              <a:rPr lang="en-150" dirty="0" err="1">
+                <a:latin typeface="Consolas" panose="020B0609020204030204" pitchFamily="49" charset="0"/>
+              </a:rPr>
+              <a:t>my_string</a:t>
+            </a:r>
+            <a:r>
+              <a:rPr lang="en-150" dirty="0">
+                <a:latin typeface="Consolas" panose="020B0609020204030204" pitchFamily="49" charset="0"/>
+              </a:rPr>
+              <a:t>[0:5]</a:t>
+            </a:r>
+          </a:p>
+          <a:p>
+            <a:r>
+              <a:rPr lang="en-150" dirty="0" err="1">
+                <a:latin typeface="Consolas" panose="020B0609020204030204" pitchFamily="49" charset="0"/>
+              </a:rPr>
+              <a:t>my_string</a:t>
+            </a:r>
+            <a:r>
+              <a:rPr lang="en-150" dirty="0">
+                <a:latin typeface="Consolas" panose="020B0609020204030204" pitchFamily="49" charset="0"/>
+              </a:rPr>
+              <a:t>[-1]</a:t>
+            </a:r>
+          </a:p>
+          <a:p>
+            <a:r>
+              <a:rPr lang="en-150" dirty="0" err="1">
+                <a:latin typeface="Consolas" panose="020B0609020204030204" pitchFamily="49" charset="0"/>
+              </a:rPr>
+              <a:t>my_string</a:t>
+            </a:r>
+            <a:r>
+              <a:rPr lang="en-150" dirty="0">
+                <a:latin typeface="Consolas" panose="020B0609020204030204" pitchFamily="49" charset="0"/>
+              </a:rPr>
+              <a:t>[6:11] = "</a:t>
+            </a:r>
+            <a:r>
+              <a:rPr lang="fr-BE" dirty="0">
+                <a:latin typeface="Consolas" panose="020B0609020204030204" pitchFamily="49" charset="0"/>
+              </a:rPr>
+              <a:t>m</a:t>
+            </a:r>
+            <a:r>
+              <a:rPr lang="en-150" dirty="0">
+                <a:latin typeface="Consolas" panose="020B0609020204030204" pitchFamily="49" charset="0"/>
+              </a:rPr>
+              <a:t>e"</a:t>
+            </a:r>
+          </a:p>
+          <a:p>
+            <a:r>
+              <a:rPr lang="en-150" dirty="0">
+                <a:latin typeface="Consolas" panose="020B0609020204030204" pitchFamily="49" charset="0"/>
+              </a:rPr>
+              <a:t>m</a:t>
+            </a:r>
+            <a:r>
+              <a:rPr lang="fr-BE" dirty="0">
+                <a:latin typeface="Consolas" panose="020B0609020204030204" pitchFamily="49" charset="0"/>
+              </a:rPr>
+              <a:t>y</a:t>
+            </a:r>
+            <a:r>
+              <a:rPr lang="en-150" dirty="0">
+                <a:latin typeface="Consolas" panose="020B0609020204030204" pitchFamily="49" charset="0"/>
+              </a:rPr>
+              <a:t>_</a:t>
+            </a:r>
+            <a:r>
+              <a:rPr lang="fr-BE" dirty="0">
+                <a:latin typeface="Consolas" panose="020B0609020204030204" pitchFamily="49" charset="0"/>
+              </a:rPr>
+              <a:t>s</a:t>
+            </a:r>
+            <a:r>
+              <a:rPr lang="en-150" dirty="0">
+                <a:latin typeface="Consolas" panose="020B0609020204030204" pitchFamily="49" charset="0"/>
+              </a:rPr>
+              <a:t>t</a:t>
+            </a:r>
+            <a:r>
+              <a:rPr lang="fr-BE" dirty="0">
+                <a:latin typeface="Consolas" panose="020B0609020204030204" pitchFamily="49" charset="0"/>
+              </a:rPr>
+              <a:t>r</a:t>
+            </a:r>
+            <a:r>
+              <a:rPr lang="en-150" dirty="0" err="1">
+                <a:latin typeface="Consolas" panose="020B0609020204030204" pitchFamily="49" charset="0"/>
+              </a:rPr>
+              <a:t>i</a:t>
+            </a:r>
+            <a:r>
+              <a:rPr lang="fr-BE" dirty="0">
+                <a:latin typeface="Consolas" panose="020B0609020204030204" pitchFamily="49" charset="0"/>
+              </a:rPr>
+              <a:t>n</a:t>
+            </a:r>
+            <a:r>
+              <a:rPr lang="en-150" dirty="0">
+                <a:latin typeface="Consolas" panose="020B0609020204030204" pitchFamily="49" charset="0"/>
+              </a:rPr>
+              <a:t>g.</a:t>
+            </a:r>
+            <a:r>
+              <a:rPr lang="fr-BE" dirty="0">
+                <a:latin typeface="Consolas" panose="020B0609020204030204" pitchFamily="49" charset="0"/>
+              </a:rPr>
+              <a:t>l</a:t>
+            </a:r>
+            <a:r>
+              <a:rPr lang="en-150" dirty="0">
+                <a:latin typeface="Consolas" panose="020B0609020204030204" pitchFamily="49" charset="0"/>
+              </a:rPr>
+              <a:t>o</a:t>
+            </a:r>
+            <a:r>
+              <a:rPr lang="fr-BE" dirty="0">
+                <a:latin typeface="Consolas" panose="020B0609020204030204" pitchFamily="49" charset="0"/>
+              </a:rPr>
+              <a:t>w</a:t>
+            </a:r>
+            <a:r>
+              <a:rPr lang="en-150" dirty="0">
+                <a:latin typeface="Consolas" panose="020B0609020204030204" pitchFamily="49" charset="0"/>
+              </a:rPr>
+              <a:t>e</a:t>
+            </a:r>
+            <a:r>
+              <a:rPr lang="fr-BE" dirty="0">
+                <a:latin typeface="Consolas" panose="020B0609020204030204" pitchFamily="49" charset="0"/>
+              </a:rPr>
+              <a:t>r</a:t>
+            </a:r>
+            <a:r>
+              <a:rPr lang="en-150" dirty="0">
+                <a:latin typeface="Consolas" panose="020B0609020204030204" pitchFamily="49" charset="0"/>
+              </a:rPr>
+              <a:t>()</a:t>
             </a:r>
             <a:endParaRPr lang="fr-BE" dirty="0">
               <a:latin typeface="Consolas" panose="020B0609020204030204" pitchFamily="49" charset="0"/>
@@ -9536,7 +9611,7 @@
     </p:spTree>
     <p:extLst>
       <p:ext uri="{BB962C8B-B14F-4D97-AF65-F5344CB8AC3E}">
-        <p14:creationId xmlns:p14="http://schemas.microsoft.com/office/powerpoint/2010/main" val="536532216"/>
+        <p14:creationId xmlns:p14="http://schemas.microsoft.com/office/powerpoint/2010/main" val="1218455973"/>
       </p:ext>
     </p:extLst>
   </p:cSld>
@@ -9606,6 +9681,38 @@
             </a:r>
             <a:r>
               <a:rPr lang="en-150" dirty="0"/>
+              <a:t>s </a:t>
+            </a:r>
+            <a:r>
+              <a:rPr lang="fr-BE" dirty="0"/>
+              <a:t>e</a:t>
+            </a:r>
+            <a:r>
+              <a:rPr lang="en-150" dirty="0"/>
+              <a:t>t </a:t>
+            </a:r>
+            <a:r>
+              <a:rPr lang="fr-BE" dirty="0"/>
+              <a:t>t</a:t>
+            </a:r>
+            <a:r>
+              <a:rPr lang="en-150" dirty="0"/>
+              <a:t>u</a:t>
+            </a:r>
+            <a:r>
+              <a:rPr lang="fr-BE" dirty="0"/>
+              <a:t>p</a:t>
+            </a:r>
+            <a:r>
+              <a:rPr lang="en-150" dirty="0"/>
+              <a:t>l</a:t>
+            </a:r>
+            <a:r>
+              <a:rPr lang="fr-BE" dirty="0"/>
+              <a:t>e</a:t>
+            </a:r>
+            <a:r>
+              <a:rPr lang="en-150" dirty="0"/>
               <a:t>s</a:t>
             </a:r>
             <a:endParaRPr lang="fr-BE" dirty="0"/>
@@ -9634,52 +9741,115 @@
           <a:lstStyle/>
           <a:p>
             <a:r>
+              <a:rPr lang="fr-BE" dirty="0" err="1">
+                <a:latin typeface="Consolas" panose="020B0609020204030204" pitchFamily="49" charset="0"/>
+              </a:rPr>
+              <a:t>my_tuple</a:t>
+            </a:r>
+            <a:r>
+              <a:rPr lang="en-150" dirty="0">
+                <a:latin typeface="Consolas" panose="020B0609020204030204" pitchFamily="49" charset="0"/>
+              </a:rPr>
+              <a:t> = (0, 1, 2, 3)</a:t>
+            </a:r>
+          </a:p>
+          <a:p>
+            <a:r>
               <a:rPr lang="en-150" dirty="0" err="1">
                 <a:latin typeface="Consolas" panose="020B0609020204030204" pitchFamily="49" charset="0"/>
               </a:rPr>
-              <a:t>my_list</a:t>
+              <a:t>len</a:t>
             </a:r>
             <a:r>
               <a:rPr lang="en-150" dirty="0">
                 <a:latin typeface="Consolas" panose="020B0609020204030204" pitchFamily="49" charset="0"/>
               </a:rPr>
-              <a:t>[2] = 5</a:t>
-            </a:r>
-          </a:p>
-          <a:p>
-            <a:r>
-              <a:rPr lang="en-150" dirty="0" err="1">
-                <a:latin typeface="Consolas" panose="020B0609020204030204" pitchFamily="49" charset="0"/>
-              </a:rPr>
-              <a:t>my_list.append</a:t>
+              <a:t>(</a:t>
+            </a:r>
+            <a:r>
+              <a:rPr lang="fr-BE" dirty="0" err="1">
+                <a:latin typeface="Consolas" panose="020B0609020204030204" pitchFamily="49" charset="0"/>
+              </a:rPr>
+              <a:t>my_tuple</a:t>
             </a:r>
             <a:r>
               <a:rPr lang="en-150" dirty="0">
                 <a:latin typeface="Consolas" panose="020B0609020204030204" pitchFamily="49" charset="0"/>
               </a:rPr>
-              <a:t>(4)</a:t>
-            </a:r>
-          </a:p>
-          <a:p>
-            <a:r>
-              <a:rPr lang="en-150" dirty="0" err="1">
-                <a:latin typeface="Consolas" panose="020B0609020204030204" pitchFamily="49" charset="0"/>
-              </a:rPr>
-              <a:t>my_list.extend</a:t>
+              <a:t>)</a:t>
+            </a:r>
+          </a:p>
+          <a:p>
+            <a:r>
+              <a:rPr lang="fr-BE" dirty="0" err="1">
+                <a:latin typeface="Consolas" panose="020B0609020204030204" pitchFamily="49" charset="0"/>
+              </a:rPr>
+              <a:t>my_tuple</a:t>
             </a:r>
             <a:r>
               <a:rPr lang="en-150" dirty="0">
                 <a:latin typeface="Consolas" panose="020B0609020204030204" pitchFamily="49" charset="0"/>
               </a:rPr>
-              <a:t>([4, 5, 6])</a:t>
-            </a:r>
+              <a:t>[2]</a:t>
+            </a:r>
+          </a:p>
+          <a:p>
+            <a:r>
+              <a:rPr lang="fr-BE" dirty="0" err="1">
+                <a:latin typeface="Consolas" panose="020B0609020204030204" pitchFamily="49" charset="0"/>
+              </a:rPr>
+              <a:t>my_tuple</a:t>
+            </a:r>
+            <a:r>
+              <a:rPr lang="en-150" dirty="0">
+                <a:latin typeface="Consolas" panose="020B0609020204030204" pitchFamily="49" charset="0"/>
+              </a:rPr>
+              <a:t>[0:2]</a:t>
+            </a:r>
+          </a:p>
+          <a:p>
+            <a:r>
+              <a:rPr lang="fr-BE" dirty="0" err="1">
+                <a:latin typeface="Consolas" panose="020B0609020204030204" pitchFamily="49" charset="0"/>
+              </a:rPr>
+              <a:t>my_tuple</a:t>
+            </a:r>
+            <a:r>
+              <a:rPr lang="en-150" dirty="0">
+                <a:latin typeface="Consolas" panose="020B0609020204030204" pitchFamily="49" charset="0"/>
+              </a:rPr>
+              <a:t>[-2]</a:t>
+            </a:r>
+          </a:p>
+          <a:p>
+            <a:r>
+              <a:rPr lang="en-150" dirty="0">
+                <a:latin typeface="Consolas" panose="020B0609020204030204" pitchFamily="49" charset="0"/>
+              </a:rPr>
+              <a:t>min(</a:t>
+            </a:r>
+            <a:r>
+              <a:rPr lang="fr-BE" dirty="0" err="1">
+                <a:latin typeface="Consolas" panose="020B0609020204030204" pitchFamily="49" charset="0"/>
+              </a:rPr>
+              <a:t>my_tuple</a:t>
+            </a:r>
+            <a:r>
+              <a:rPr lang="en-150" dirty="0">
+                <a:latin typeface="Consolas" panose="020B0609020204030204" pitchFamily="49" charset="0"/>
+              </a:rPr>
+              <a:t>)</a:t>
+            </a:r>
+            <a:endParaRPr lang="fr-BE" dirty="0">
+              <a:latin typeface="Consolas" panose="020B0609020204030204" pitchFamily="49" charset="0"/>
+            </a:endParaRPr>
           </a:p>
         </p:txBody>
       </p:sp>
     </p:spTree>
     <p:extLst>
       <p:ext uri="{BB962C8B-B14F-4D97-AF65-F5344CB8AC3E}">
-        <p14:creationId xmlns:p14="http://schemas.microsoft.com/office/powerpoint/2010/main" val="3382823401"/>
+        <p14:creationId xmlns:p14="http://schemas.microsoft.com/office/powerpoint/2010/main" val="536532216"/>
       </p:ext>
     </p:extLst>
   </p:cSld>
@@ -9711,7 +9881,7 @@
           <p:cNvPr id="2" name="Titre 1">
             <a:extLst>
               <a:ext uri="{FF2B5EF4-FFF2-40B4-BE49-F238E27FC236}">
-                <a16:creationId xmlns:a16="http://schemas.microsoft.com/office/drawing/2014/main" id="{35BFE1B1-F62F-466E-B841-9F026843B1EE}"/>
+                <a16:creationId xmlns:a16="http://schemas.microsoft.com/office/drawing/2014/main" id="{834372B4-33DC-4F47-8E09-3C2879443338}"/>
               </a:ext>
             </a:extLst>
           </p:cNvPr>
@@ -9728,20 +9898,8 @@
           <a:lstStyle/>
           <a:p>
             <a:r>
-              <a:rPr lang="en-150" dirty="0"/>
-              <a:t>D</a:t>
-            </a:r>
-            <a:r>
               <a:rPr lang="fr-BE" dirty="0"/>
-              <a:t>i</a:t>
-            </a:r>
-            <a:r>
-              <a:rPr lang="en-150" dirty="0"/>
-              <a:t>c</a:t>
-            </a:r>
-            <a:r>
-              <a:rPr lang="fr-BE" dirty="0"/>
-              <a:t>t</a:t>
+              <a:t>L</a:t>
             </a:r>
             <a:r>
               <a:rPr lang="en-150" dirty="0" err="1"/>
@@ -9749,27 +9907,11 @@
             </a:r>
             <a:r>
               <a:rPr lang="fr-BE" dirty="0"/>
-              <a:t>o</a:t>
+              <a:t>s</a:t>
             </a:r>
             <a:r>
               <a:rPr lang="en-150" dirty="0"/>
-              <a:t>n</a:t>
-            </a:r>
-            <a:r>
-              <a:rPr lang="fr-BE" dirty="0"/>
-              <a:t>n</a:t>
-            </a:r>
-            <a:r>
-              <a:rPr lang="en-150" dirty="0"/>
-              <a:t>a</a:t>
-            </a:r>
-            <a:r>
-              <a:rPr lang="fr-BE" dirty="0"/>
-              <a:t>i</a:t>
-            </a:r>
-            <a:r>
-              <a:rPr lang="en-150" dirty="0"/>
-              <a:t>r</a:t>
+              <a:t>t</a:t>
             </a:r>
             <a:r>
               <a:rPr lang="fr-BE" dirty="0"/>
@@ -9788,7 +9930,7 @@
           <p:cNvPr id="3" name="Espace réservé du contenu 2">
             <a:extLst>
               <a:ext uri="{FF2B5EF4-FFF2-40B4-BE49-F238E27FC236}">
-                <a16:creationId xmlns:a16="http://schemas.microsoft.com/office/drawing/2014/main" id="{4199692A-F9D4-4D44-A0B0-F8D3DFD631FE}"/>
+                <a16:creationId xmlns:a16="http://schemas.microsoft.com/office/drawing/2014/main" id="{42425188-2AE9-4651-AD75-7785ED01846B}"/>
               </a:ext>
             </a:extLst>
           </p:cNvPr>
@@ -9805,151 +9947,52 @@
           <a:lstStyle/>
           <a:p>
             <a:r>
-              <a:rPr lang="en-150" dirty="0"/>
-              <a:t>m</a:t>
-            </a:r>
-            <a:r>
-              <a:rPr lang="fr-BE" dirty="0"/>
-              <a:t>y</a:t>
-            </a:r>
-            <a:r>
-              <a:rPr lang="en-150" dirty="0"/>
-              <a:t>_</a:t>
-            </a:r>
-            <a:r>
-              <a:rPr lang="fr-BE" dirty="0"/>
-              <a:t>d</a:t>
-            </a:r>
-            <a:r>
-              <a:rPr lang="en-150" dirty="0" err="1"/>
-              <a:t>i</a:t>
-            </a:r>
-            <a:r>
-              <a:rPr lang="fr-BE" dirty="0"/>
-              <a:t>c</a:t>
-            </a:r>
-            <a:r>
-              <a:rPr lang="en-150" dirty="0"/>
-              <a:t>t = { "</a:t>
-            </a:r>
-            <a:r>
-              <a:rPr lang="fr-BE" dirty="0"/>
-              <a:t>o</a:t>
-            </a:r>
-            <a:r>
-              <a:rPr lang="en-150" dirty="0"/>
-              <a:t>n</a:t>
-            </a:r>
-            <a:r>
-              <a:rPr lang="fr-BE" dirty="0"/>
-              <a:t>e</a:t>
-            </a:r>
-            <a:r>
-              <a:rPr lang="en-150" dirty="0"/>
-              <a:t>": "</a:t>
-            </a:r>
-            <a:r>
-              <a:rPr lang="fr-BE" dirty="0"/>
-              <a:t>u</a:t>
-            </a:r>
-            <a:r>
-              <a:rPr lang="en-150" dirty="0"/>
-              <a:t>n", "</a:t>
-            </a:r>
-            <a:r>
-              <a:rPr lang="fr-BE" dirty="0"/>
-              <a:t>t</a:t>
-            </a:r>
-            <a:r>
-              <a:rPr lang="en-150" dirty="0"/>
-              <a:t>w</a:t>
-            </a:r>
-            <a:r>
-              <a:rPr lang="fr-BE" dirty="0"/>
-              <a:t>o</a:t>
-            </a:r>
-            <a:r>
-              <a:rPr lang="en-150" dirty="0"/>
-              <a:t>": "</a:t>
-            </a:r>
-            <a:r>
-              <a:rPr lang="fr-BE" dirty="0"/>
-              <a:t>d</a:t>
-            </a:r>
-            <a:r>
-              <a:rPr lang="en-150" dirty="0" err="1"/>
-              <a:t>eux</a:t>
-            </a:r>
-            <a:r>
-              <a:rPr lang="en-150" dirty="0"/>
-              <a:t>", "three": "trois" }</a:t>
-            </a:r>
-          </a:p>
-          <a:p>
-            <a:r>
-              <a:rPr lang="en-150" dirty="0" err="1"/>
-              <a:t>my_dict</a:t>
-            </a:r>
-            <a:r>
-              <a:rPr lang="en-150" dirty="0"/>
-              <a:t>["two"]</a:t>
-            </a:r>
-          </a:p>
-          <a:p>
-            <a:r>
-              <a:rPr lang="en-150" dirty="0" err="1"/>
-              <a:t>my_dict</a:t>
-            </a:r>
-            <a:r>
-              <a:rPr lang="en-150" dirty="0"/>
-              <a:t>["four"] = "</a:t>
-            </a:r>
-            <a:r>
-              <a:rPr lang="en-150" dirty="0" err="1"/>
-              <a:t>quatre</a:t>
-            </a:r>
-            <a:r>
-              <a:rPr lang="en-150" dirty="0"/>
-              <a:t>"</a:t>
-            </a:r>
-          </a:p>
-          <a:p>
-            <a:r>
-              <a:rPr lang="en-150" dirty="0" err="1"/>
-              <a:t>my_dict.items</a:t>
-            </a:r>
-            <a:r>
-              <a:rPr lang="en-150" dirty="0"/>
-              <a:t>()</a:t>
-            </a:r>
-          </a:p>
-          <a:p>
-            <a:r>
-              <a:rPr lang="en-150" dirty="0" err="1"/>
-              <a:t>my_dict.keys</a:t>
-            </a:r>
-            <a:r>
-              <a:rPr lang="en-150" dirty="0"/>
-              <a:t>()</a:t>
-            </a:r>
-          </a:p>
-          <a:p>
-            <a:r>
-              <a:rPr lang="en-150" dirty="0" err="1"/>
-              <a:t>my_dict.values</a:t>
-            </a:r>
-            <a:r>
-              <a:rPr lang="en-150" dirty="0"/>
-              <a:t>()</a:t>
-            </a:r>
-            <a:endParaRPr lang="fr-BE" dirty="0"/>
+              <a:rPr lang="en-150" dirty="0" err="1">
+                <a:latin typeface="Consolas" panose="020B0609020204030204" pitchFamily="49" charset="0"/>
+              </a:rPr>
+              <a:t>my_list</a:t>
+            </a:r>
+            <a:r>
+              <a:rPr lang="en-150" dirty="0">
+                <a:latin typeface="Consolas" panose="020B0609020204030204" pitchFamily="49" charset="0"/>
+              </a:rPr>
+              <a:t>[2] = 5</a:t>
+            </a:r>
+          </a:p>
+          <a:p>
+            <a:r>
+              <a:rPr lang="en-150" dirty="0" err="1">
+                <a:latin typeface="Consolas" panose="020B0609020204030204" pitchFamily="49" charset="0"/>
+              </a:rPr>
+              <a:t>my_list.append</a:t>
+            </a:r>
+            <a:r>
+              <a:rPr lang="en-150" dirty="0">
+                <a:latin typeface="Consolas" panose="020B0609020204030204" pitchFamily="49" charset="0"/>
+              </a:rPr>
+              <a:t>(4)</a:t>
+            </a:r>
+          </a:p>
+          <a:p>
+            <a:r>
+              <a:rPr lang="en-150" dirty="0" err="1">
+                <a:latin typeface="Consolas" panose="020B0609020204030204" pitchFamily="49" charset="0"/>
+              </a:rPr>
+              <a:t>my_list.extend</a:t>
+            </a:r>
+            <a:r>
+              <a:rPr lang="en-150" dirty="0">
+                <a:latin typeface="Consolas" panose="020B0609020204030204" pitchFamily="49" charset="0"/>
+              </a:rPr>
+              <a:t>([4, 5, 6])</a:t>
+            </a:r>
           </a:p>
         </p:txBody>
       </p:sp>
     </p:spTree>
     <p:extLst>
       <p:ext uri="{BB962C8B-B14F-4D97-AF65-F5344CB8AC3E}">
-        <p14:creationId xmlns:p14="http://schemas.microsoft.com/office/powerpoint/2010/main" val="3332601789"/>
+        <p14:creationId xmlns:p14="http://schemas.microsoft.com/office/powerpoint/2010/main" val="3382823401"/>
       </p:ext>
     </p:extLst>
   </p:cSld>
@@ -9981,7 +10024,7 @@
           <p:cNvPr id="2" name="Titre 1">
             <a:extLst>
               <a:ext uri="{FF2B5EF4-FFF2-40B4-BE49-F238E27FC236}">
-                <a16:creationId xmlns:a16="http://schemas.microsoft.com/office/drawing/2014/main" id="{CE1352C1-DE35-415E-8BF5-13103C5DC8BD}"/>
+                <a16:creationId xmlns:a16="http://schemas.microsoft.com/office/drawing/2014/main" id="{35BFE1B1-F62F-466E-B841-9F026843B1EE}"/>
               </a:ext>
             </a:extLst>
           </p:cNvPr>
@@ -9999,19 +10042,11 @@
           <a:p>
             <a:r>
               <a:rPr lang="en-150" dirty="0"/>
-              <a:t>E</a:t>
+              <a:t>D</a:t>
             </a:r>
             <a:r>
               <a:rPr lang="fr-BE" dirty="0"/>
-              <a:t>x</a:t>
-            </a:r>
-            <a:r>
-              <a:rPr lang="en-150" dirty="0"/>
-              <a:t>e</a:t>
-            </a:r>
-            <a:r>
-              <a:rPr lang="fr-BE" dirty="0"/>
-              <a:t>r</a:t>
+              <a:t>i</a:t>
             </a:r>
             <a:r>
               <a:rPr lang="en-150" dirty="0"/>
@@ -10019,11 +10054,35 @@
             </a:r>
             <a:r>
               <a:rPr lang="fr-BE" dirty="0"/>
+              <a:t>t</a:t>
+            </a:r>
+            <a:r>
+              <a:rPr lang="en-150" dirty="0" err="1"/>
               <a:t>i</a:t>
             </a:r>
             <a:r>
+              <a:rPr lang="fr-BE" dirty="0"/>
+              <a:t>o</a:t>
+            </a:r>
+            <a:r>
               <a:rPr lang="en-150" dirty="0"/>
-              <a:t>c</a:t>
+              <a:t>n</a:t>
+            </a:r>
+            <a:r>
+              <a:rPr lang="fr-BE" dirty="0"/>
+              <a:t>n</a:t>
+            </a:r>
+            <a:r>
+              <a:rPr lang="en-150" dirty="0"/>
+              <a:t>a</a:t>
+            </a:r>
+            <a:r>
+              <a:rPr lang="fr-BE" dirty="0"/>
+              <a:t>i</a:t>
+            </a:r>
+            <a:r>
+              <a:rPr lang="en-150" dirty="0"/>
+              <a:t>r</a:t>
             </a:r>
             <a:r>
               <a:rPr lang="fr-BE" dirty="0"/>
@@ -10031,7 +10090,7 @@
             </a:r>
             <a:r>
               <a:rPr lang="en-150" dirty="0"/>
-              <a:t> 4</a:t>
+              <a:t>s</a:t>
             </a:r>
             <a:endParaRPr lang="fr-BE" dirty="0"/>
           </a:p>
@@ -10042,7 +10101,7 @@
           <p:cNvPr id="3" name="Espace réservé du contenu 2">
             <a:extLst>
               <a:ext uri="{FF2B5EF4-FFF2-40B4-BE49-F238E27FC236}">
-                <a16:creationId xmlns:a16="http://schemas.microsoft.com/office/drawing/2014/main" id="{2529069E-B452-41D0-9697-D2E4AD3588D7}"/>
+                <a16:creationId xmlns:a16="http://schemas.microsoft.com/office/drawing/2014/main" id="{4199692A-F9D4-4D44-A0B0-F8D3DFD631FE}"/>
               </a:ext>
             </a:extLst>
           </p:cNvPr>
@@ -10060,7 +10119,55 @@
           <a:p>
             <a:r>
               <a:rPr lang="en-150" dirty="0"/>
-              <a:t>S</a:t>
+              <a:t>m</a:t>
+            </a:r>
+            <a:r>
+              <a:rPr lang="fr-BE" dirty="0"/>
+              <a:t>y</a:t>
+            </a:r>
+            <a:r>
+              <a:rPr lang="en-150" dirty="0"/>
+              <a:t>_</a:t>
+            </a:r>
+            <a:r>
+              <a:rPr lang="fr-BE" dirty="0"/>
+              <a:t>d</a:t>
+            </a:r>
+            <a:r>
+              <a:rPr lang="en-150" dirty="0" err="1"/>
+              <a:t>i</a:t>
+            </a:r>
+            <a:r>
+              <a:rPr lang="fr-BE" dirty="0"/>
+              <a:t>c</a:t>
+            </a:r>
+            <a:r>
+              <a:rPr lang="en-150" dirty="0"/>
+              <a:t>t = { "</a:t>
+            </a:r>
+            <a:r>
+              <a:rPr lang="fr-BE" dirty="0"/>
+              <a:t>o</a:t>
+            </a:r>
+            <a:r>
+              <a:rPr lang="en-150" dirty="0"/>
+              <a:t>n</a:t>
+            </a:r>
+            <a:r>
+              <a:rPr lang="fr-BE" dirty="0"/>
+              <a:t>e</a:t>
+            </a:r>
+            <a:r>
+              <a:rPr lang="en-150" dirty="0"/>
+              <a:t>": "</a:t>
+            </a:r>
+            <a:r>
+              <a:rPr lang="fr-BE" dirty="0"/>
+              <a:t>u</a:t>
+            </a:r>
+            <a:r>
+              <a:rPr lang="en-150" dirty="0"/>
+              <a:t>n", "</a:t>
             </a:r>
             <a:r>
               <a:rPr lang="fr-BE" dirty="0"/>
@@ -10068,83 +10175,94 @@
             </a:r>
             <a:r>
               <a:rPr lang="en-150" dirty="0"/>
-              <a:t>r</a:t>
+              <a:t>w</a:t>
             </a:r>
             <a:r>
               <a:rPr lang="fr-BE" dirty="0"/>
-              <a:t>u</a:t>
+              <a:t>o</a:t>
             </a:r>
             <a:r>
               <a:rPr lang="en-150" dirty="0"/>
-              <a:t>c</a:t>
-            </a:r>
-            <a:r>
-              <a:rPr lang="fr-BE" dirty="0"/>
-              <a:t>t</a:t>
-            </a:r>
-            <a:r>
-              <a:rPr lang="en-150" dirty="0"/>
-              <a:t>u</a:t>
-            </a:r>
-            <a:r>
-              <a:rPr lang="fr-BE" dirty="0"/>
-              <a:t>r</a:t>
-            </a:r>
-            <a:r>
-              <a:rPr lang="en-150" dirty="0"/>
-              <a:t>e</a:t>
-            </a:r>
-            <a:r>
-              <a:rPr lang="fr-BE" dirty="0"/>
-              <a:t>s</a:t>
-            </a:r>
-            <a:r>
-              <a:rPr lang="en-150" dirty="0"/>
-              <a:t> </a:t>
+              <a:t>": "</a:t>
             </a:r>
             <a:r>
               <a:rPr lang="fr-BE" dirty="0"/>
               <a:t>d</a:t>
             </a:r>
             <a:r>
+              <a:rPr lang="en-150" dirty="0" err="1"/>
+              <a:t>eux</a:t>
+            </a:r>
+            <a:r>
               <a:rPr lang="en-150" dirty="0"/>
-              <a:t>e </a:t>
-            </a:r>
-            <a:r>
-              <a:rPr lang="fr-BE" dirty="0"/>
-              <a:t>d</a:t>
+              <a:t>", "three": "trois" }</a:t>
+            </a:r>
+          </a:p>
+          <a:p>
+            <a:r>
+              <a:rPr lang="en-150" dirty="0" err="1"/>
+              <a:t>my_dict</a:t>
             </a:r>
             <a:r>
               <a:rPr lang="en-150" dirty="0"/>
-              <a:t>o</a:t>
-            </a:r>
-            <a:r>
-              <a:rPr lang="fr-BE" dirty="0"/>
-              <a:t>n</a:t>
+              <a:t>["two"]</a:t>
+            </a:r>
+          </a:p>
+          <a:p>
+            <a:r>
+              <a:rPr lang="en-150" dirty="0" err="1"/>
+              <a:t>my_dict</a:t>
             </a:r>
             <a:r>
               <a:rPr lang="en-150" dirty="0"/>
-              <a:t>n</a:t>
-            </a:r>
-            <a:r>
-              <a:rPr lang="fr-BE" dirty="0"/>
-              <a:t>é</a:t>
+              <a:t>["four"] = "</a:t>
+            </a:r>
+            <a:r>
+              <a:rPr lang="en-150" dirty="0" err="1"/>
+              <a:t>quatre</a:t>
             </a:r>
             <a:r>
               <a:rPr lang="en-150" dirty="0"/>
-              <a:t>e</a:t>
-            </a:r>
-            <a:r>
-              <a:rPr lang="fr-BE" dirty="0"/>
-              <a:t>s</a:t>
-            </a:r>
+              <a:t>"</a:t>
+            </a:r>
+          </a:p>
+          <a:p>
+            <a:r>
+              <a:rPr lang="en-150" dirty="0" err="1"/>
+              <a:t>my_dict.items</a:t>
+            </a:r>
+            <a:r>
+              <a:rPr lang="en-150" dirty="0"/>
+              <a:t>()</a:t>
+            </a:r>
+          </a:p>
+          <a:p>
+            <a:r>
+              <a:rPr lang="en-150" dirty="0" err="1"/>
+              <a:t>my_dict.keys</a:t>
+            </a:r>
+            <a:r>
+              <a:rPr lang="en-150" dirty="0"/>
+              <a:t>()</a:t>
+            </a:r>
+          </a:p>
+          <a:p>
+            <a:r>
+              <a:rPr lang="en-150" dirty="0" err="1"/>
+              <a:t>my_dict.values</a:t>
+            </a:r>
+            <a:r>
+              <a:rPr lang="en-150" dirty="0"/>
+              <a:t>()</a:t>
+            </a:r>
+            <a:endParaRPr lang="fr-BE" dirty="0"/>
           </a:p>
         </p:txBody>
       </p:sp>
     </p:spTree>
     <p:extLst>
       <p:ext uri="{BB962C8B-B14F-4D97-AF65-F5344CB8AC3E}">
-        <p14:creationId xmlns:p14="http://schemas.microsoft.com/office/powerpoint/2010/main" val="1128532615"/>
+        <p14:creationId xmlns:p14="http://schemas.microsoft.com/office/powerpoint/2010/main" val="3332601789"/>
       </p:ext>
     </p:extLst>
   </p:cSld>
@@ -10173,10 +10291,10 @@
       </p:grpSpPr>
       <p:sp>
         <p:nvSpPr>
-          <p:cNvPr id="4" name="Titre 3">
+          <p:cNvPr id="2" name="Titre 1">
             <a:extLst>
               <a:ext uri="{FF2B5EF4-FFF2-40B4-BE49-F238E27FC236}">
-                <a16:creationId xmlns:a16="http://schemas.microsoft.com/office/drawing/2014/main" id="{7C12A1B3-30A1-44D3-964B-8F4B3150E160}"/>
+                <a16:creationId xmlns:a16="http://schemas.microsoft.com/office/drawing/2014/main" id="{CE1352C1-DE35-415E-8BF5-13103C5DC8BD}"/>
               </a:ext>
             </a:extLst>
           </p:cNvPr>
@@ -10193,23 +10311,51 @@
           <a:lstStyle/>
           <a:p>
             <a:r>
-              <a:rPr lang="en-US"/>
-              <a:t>Classes et </a:t>
-            </a:r>
-            <a:r>
-              <a:rPr lang="en-US" err="1"/>
-              <a:t>objets</a:t>
-            </a:r>
-            <a:endParaRPr lang="fr-BE"/>
-          </a:p>
-        </p:txBody>
-      </p:sp>
-      <p:sp>
-        <p:nvSpPr>
-          <p:cNvPr id="5" name="Espace réservé du texte 4">
+              <a:rPr lang="en-150" dirty="0"/>
+              <a:t>E</a:t>
+            </a:r>
+            <a:r>
+              <a:rPr lang="fr-BE" dirty="0"/>
+              <a:t>x</a:t>
+            </a:r>
+            <a:r>
+              <a:rPr lang="en-150" dirty="0"/>
+              <a:t>e</a:t>
+            </a:r>
+            <a:r>
+              <a:rPr lang="fr-BE" dirty="0"/>
+              <a:t>r</a:t>
+            </a:r>
+            <a:r>
+              <a:rPr lang="en-150" dirty="0"/>
+              <a:t>c</a:t>
+            </a:r>
+            <a:r>
+              <a:rPr lang="fr-BE" dirty="0"/>
+              <a:t>i</a:t>
+            </a:r>
+            <a:r>
+              <a:rPr lang="en-150" dirty="0"/>
+              <a:t>c</a:t>
+            </a:r>
+            <a:r>
+              <a:rPr lang="fr-BE" dirty="0"/>
+              <a:t>e</a:t>
+            </a:r>
+            <a:r>
+              <a:rPr lang="en-150" dirty="0"/>
+              <a:t> 4</a:t>
+            </a:r>
+            <a:endParaRPr lang="fr-BE" dirty="0"/>
+          </a:p>
+        </p:txBody>
+      </p:sp>
+      <p:sp>
+        <p:nvSpPr>
+          <p:cNvPr id="3" name="Espace réservé du contenu 2">
             <a:extLst>
               <a:ext uri="{FF2B5EF4-FFF2-40B4-BE49-F238E27FC236}">
-                <a16:creationId xmlns:a16="http://schemas.microsoft.com/office/drawing/2014/main" id="{5CB98627-E081-4135-900C-B01051FF44F0}"/>
+                <a16:creationId xmlns:a16="http://schemas.microsoft.com/office/drawing/2014/main" id="{2529069E-B452-41D0-9697-D2E4AD3588D7}"/>
               </a:ext>
             </a:extLst>
           </p:cNvPr>
@@ -10217,7 +10363,7 @@
             <a:spLocks noGrp="1"/>
           </p:cNvSpPr>
           <p:nvPr>
-            <p:ph type="body" idx="1"/>
+            <p:ph idx="1"/>
           </p:nvPr>
         </p:nvSpPr>
         <p:spPr/>
@@ -10225,14 +10371,93 @@
           <a:bodyPr/>
           <a:lstStyle/>
           <a:p>
-            <a:endParaRPr lang="fr-BE"/>
+            <a:r>
+              <a:rPr lang="en-150" dirty="0"/>
+              <a:t>S</a:t>
+            </a:r>
+            <a:r>
+              <a:rPr lang="fr-BE" dirty="0"/>
+              <a:t>t</a:t>
+            </a:r>
+            <a:r>
+              <a:rPr lang="en-150" dirty="0"/>
+              <a:t>r</a:t>
+            </a:r>
+            <a:r>
+              <a:rPr lang="fr-BE" dirty="0"/>
+              <a:t>u</a:t>
+            </a:r>
+            <a:r>
+              <a:rPr lang="en-150" dirty="0"/>
+              <a:t>c</a:t>
+            </a:r>
+            <a:r>
+              <a:rPr lang="fr-BE" dirty="0"/>
+              <a:t>t</a:t>
+            </a:r>
+            <a:r>
+              <a:rPr lang="en-150" dirty="0"/>
+              <a:t>u</a:t>
+            </a:r>
+            <a:r>
+              <a:rPr lang="fr-BE" dirty="0"/>
+              <a:t>r</a:t>
+            </a:r>
+            <a:r>
+              <a:rPr lang="en-150" dirty="0"/>
+              <a:t>e</a:t>
+            </a:r>
+            <a:r>
+              <a:rPr lang="fr-BE" dirty="0"/>
+              <a:t>s</a:t>
+            </a:r>
+            <a:r>
+              <a:rPr lang="en-150" dirty="0"/>
+              <a:t> </a:t>
+            </a:r>
+            <a:r>
+              <a:rPr lang="fr-BE" dirty="0"/>
+              <a:t>d</a:t>
+            </a:r>
+            <a:r>
+              <a:rPr lang="en-150" dirty="0"/>
+              <a:t>e </a:t>
+            </a:r>
+            <a:r>
+              <a:rPr lang="fr-BE" dirty="0"/>
+              <a:t>d</a:t>
+            </a:r>
+            <a:r>
+              <a:rPr lang="en-150" dirty="0"/>
+              <a:t>o</a:t>
+            </a:r>
+            <a:r>
+              <a:rPr lang="fr-BE" dirty="0"/>
+              <a:t>n</a:t>
+            </a:r>
+            <a:r>
+              <a:rPr lang="en-150" dirty="0"/>
+              <a:t>n</a:t>
+            </a:r>
+            <a:r>
+              <a:rPr lang="fr-BE" dirty="0"/>
+              <a:t>é</a:t>
+            </a:r>
+            <a:r>
+              <a:rPr lang="en-150" dirty="0"/>
+              <a:t>e</a:t>
+            </a:r>
+            <a:r>
+              <a:rPr lang="fr-BE" dirty="0"/>
+              <a:t>s</a:t>
+            </a:r>
           </a:p>
         </p:txBody>
       </p:sp>
     </p:spTree>
     <p:extLst>
       <p:ext uri="{BB962C8B-B14F-4D97-AF65-F5344CB8AC3E}">
-        <p14:creationId xmlns:p14="http://schemas.microsoft.com/office/powerpoint/2010/main" val="2278141950"/>
+        <p14:creationId xmlns:p14="http://schemas.microsoft.com/office/powerpoint/2010/main" val="1128532615"/>
       </p:ext>
     </p:extLst>
   </p:cSld>
@@ -10264,7 +10489,7 @@
           <p:cNvPr id="2" name="Titre 1">
             <a:extLst>
               <a:ext uri="{FF2B5EF4-FFF2-40B4-BE49-F238E27FC236}">
-                <a16:creationId xmlns:a16="http://schemas.microsoft.com/office/drawing/2014/main" id="{BEDBDA12-EB8E-428F-B7B1-D8B47CACE37A}"/>
+                <a16:creationId xmlns:a16="http://schemas.microsoft.com/office/drawing/2014/main" id="{4184C4FF-5245-44AA-9C81-64C7547E3FCF}"/>
               </a:ext>
             </a:extLst>
           </p:cNvPr>
@@ -10281,23 +10506,27 @@
           <a:lstStyle/>
           <a:p>
             <a:r>
-              <a:rPr lang="en-US"/>
-              <a:t>Conventions de </a:t>
-            </a:r>
-            <a:r>
-              <a:rPr lang="en-US" err="1"/>
-              <a:t>codage</a:t>
-            </a:r>
-            <a:endParaRPr lang="fr-BE"/>
-          </a:p>
-        </p:txBody>
-      </p:sp>
-      <p:sp>
-        <p:nvSpPr>
-          <p:cNvPr id="3" name="Espace réservé du texte 2">
+              <a:rPr lang="en-US" dirty="0" err="1"/>
+              <a:t>Compréhension</a:t>
+            </a:r>
+            <a:r>
+              <a:rPr lang="en-US" dirty="0"/>
+              <a:t> de </a:t>
+            </a:r>
+            <a:r>
+              <a:rPr lang="en-US" dirty="0" err="1"/>
+              <a:t>listes</a:t>
+            </a:r>
+            <a:endParaRPr lang="fr-BE" dirty="0"/>
+          </a:p>
+        </p:txBody>
+      </p:sp>
+      <p:sp>
+        <p:nvSpPr>
+          <p:cNvPr id="3" name="Espace réservé du contenu 2">
             <a:extLst>
               <a:ext uri="{FF2B5EF4-FFF2-40B4-BE49-F238E27FC236}">
-                <a16:creationId xmlns:a16="http://schemas.microsoft.com/office/drawing/2014/main" id="{B3CA63D6-C4B6-4FAB-A811-FBBC5D7185B5}"/>
+                <a16:creationId xmlns:a16="http://schemas.microsoft.com/office/drawing/2014/main" id="{C652C919-6B1D-411B-A88D-B511B9188979}"/>
               </a:ext>
             </a:extLst>
           </p:cNvPr>
@@ -10305,7 +10534,7 @@
             <a:spLocks noGrp="1"/>
           </p:cNvSpPr>
           <p:nvPr>
-            <p:ph type="body" idx="1"/>
+            <p:ph idx="1"/>
           </p:nvPr>
         </p:nvSpPr>
         <p:spPr/>
@@ -10313,14 +10542,95 @@
           <a:bodyPr/>
           <a:lstStyle/>
           <a:p>
-            <a:endParaRPr lang="fr-BE"/>
+            <a:pPr marL="0" indent="0">
+              <a:buNone/>
+            </a:pPr>
+            <a:r>
+              <a:rPr lang="en-US" dirty="0">
+                <a:latin typeface="Consolas" panose="020B0609020204030204" pitchFamily="49" charset="0"/>
+              </a:rPr>
+              <a:t>squared = []</a:t>
+            </a:r>
+          </a:p>
+          <a:p>
+            <a:pPr marL="0" indent="0">
+              <a:buNone/>
+            </a:pPr>
+            <a:r>
+              <a:rPr lang="en-US" dirty="0">
+                <a:latin typeface="Consolas" panose="020B0609020204030204" pitchFamily="49" charset="0"/>
+              </a:rPr>
+              <a:t>for x in range(10):</a:t>
+            </a:r>
+            <a:endParaRPr lang="fr-BE" dirty="0">
+              <a:latin typeface="Consolas" panose="020B0609020204030204" pitchFamily="49" charset="0"/>
+            </a:endParaRPr>
+          </a:p>
+          <a:p>
+            <a:pPr marL="0" indent="0">
+              <a:buNone/>
+            </a:pPr>
+            <a:r>
+              <a:rPr lang="fr-BE" dirty="0">
+                <a:latin typeface="Consolas" panose="020B0609020204030204" pitchFamily="49" charset="0"/>
+              </a:rPr>
+              <a:t>    </a:t>
+            </a:r>
+            <a:r>
+              <a:rPr lang="fr-BE" dirty="0" err="1">
+                <a:latin typeface="Consolas" panose="020B0609020204030204" pitchFamily="49" charset="0"/>
+              </a:rPr>
+              <a:t>squared.append</a:t>
+            </a:r>
+            <a:r>
+              <a:rPr lang="fr-BE" dirty="0">
+                <a:latin typeface="Consolas" panose="020B0609020204030204" pitchFamily="49" charset="0"/>
+              </a:rPr>
+              <a:t>(x ** 2)</a:t>
+            </a:r>
+          </a:p>
+          <a:p>
+            <a:pPr marL="0" indent="0">
+              <a:buNone/>
+            </a:pPr>
+            <a:endParaRPr lang="fr-BE" dirty="0">
+              <a:latin typeface="Consolas" panose="020B0609020204030204" pitchFamily="49" charset="0"/>
+            </a:endParaRPr>
+          </a:p>
+          <a:p>
+            <a:pPr marL="0" indent="0">
+              <a:buNone/>
+            </a:pPr>
+            <a:endParaRPr lang="fr-BE" dirty="0">
+              <a:latin typeface="Consolas" panose="020B0609020204030204" pitchFamily="49" charset="0"/>
+            </a:endParaRPr>
+          </a:p>
+          <a:p>
+            <a:pPr marL="0" indent="0">
+              <a:buNone/>
+            </a:pPr>
+            <a:r>
+              <a:rPr lang="fr-BE" dirty="0" err="1">
+                <a:latin typeface="Consolas" panose="020B0609020204030204" pitchFamily="49" charset="0"/>
+              </a:rPr>
+              <a:t>squared</a:t>
+            </a:r>
+            <a:r>
+              <a:rPr lang="fr-BE" dirty="0">
+                <a:latin typeface="Consolas" panose="020B0609020204030204" pitchFamily="49" charset="0"/>
+              </a:rPr>
+              <a:t> = [x ** 2 for x in range(10)]</a:t>
+            </a:r>
+            <a:endParaRPr lang="en-US" dirty="0">
+              <a:latin typeface="Consolas" panose="020B0609020204030204" pitchFamily="49" charset="0"/>
+            </a:endParaRPr>
           </a:p>
         </p:txBody>
       </p:sp>
     </p:spTree>
     <p:extLst>
       <p:ext uri="{BB962C8B-B14F-4D97-AF65-F5344CB8AC3E}">
-        <p14:creationId xmlns:p14="http://schemas.microsoft.com/office/powerpoint/2010/main" val="3429561253"/>
+        <p14:creationId xmlns:p14="http://schemas.microsoft.com/office/powerpoint/2010/main" val="3781102486"/>
       </p:ext>
     </p:extLst>
   </p:cSld>
@@ -10646,6 +10956,826 @@
     <p:extLst>
       <p:ext uri="{BB962C8B-B14F-4D97-AF65-F5344CB8AC3E}">
         <p14:creationId xmlns:p14="http://schemas.microsoft.com/office/powerpoint/2010/main" val="403942258"/>
+      </p:ext>
+    </p:extLst>
+  </p:cSld>
+  <p:clrMapOvr>
+    <a:masterClrMapping/>
+  </p:clrMapOvr>
+</p:sld>
+</file>
+
+<file path=ppt/slides/slide30.xml><?xml version="1.0" encoding="utf-8"?>
+<p:sld xmlns:a="http://schemas.openxmlformats.org/drawingml/2006/main" xmlns:r="http://schemas.openxmlformats.org/officeDocument/2006/relationships" xmlns:p="http://schemas.openxmlformats.org/presentationml/2006/main">
+  <p:cSld>
+    <p:spTree>
+      <p:nvGrpSpPr>
+        <p:cNvPr id="1" name=""/>
+        <p:cNvGrpSpPr/>
+        <p:nvPr/>
+      </p:nvGrpSpPr>
+      <p:grpSpPr>
+        <a:xfrm>
+          <a:off x="0" y="0"/>
+          <a:ext cx="0" cy="0"/>
+          <a:chOff x="0" y="0"/>
+          <a:chExt cx="0" cy="0"/>
+        </a:xfrm>
+      </p:grpSpPr>
+      <p:sp>
+        <p:nvSpPr>
+          <p:cNvPr id="2" name="Titre 1">
+            <a:extLst>
+              <a:ext uri="{FF2B5EF4-FFF2-40B4-BE49-F238E27FC236}">
+                <a16:creationId xmlns:a16="http://schemas.microsoft.com/office/drawing/2014/main" id="{4184C4FF-5245-44AA-9C81-64C7547E3FCF}"/>
+              </a:ext>
+            </a:extLst>
+          </p:cNvPr>
+          <p:cNvSpPr>
+            <a:spLocks noGrp="1"/>
+          </p:cNvSpPr>
+          <p:nvPr>
+            <p:ph type="title"/>
+          </p:nvPr>
+        </p:nvSpPr>
+        <p:spPr/>
+        <p:txBody>
+          <a:bodyPr/>
+          <a:lstStyle/>
+          <a:p>
+            <a:r>
+              <a:rPr lang="en-US" dirty="0" err="1"/>
+              <a:t>Compréhension</a:t>
+            </a:r>
+            <a:r>
+              <a:rPr lang="en-US" dirty="0"/>
+              <a:t> de </a:t>
+            </a:r>
+            <a:r>
+              <a:rPr lang="en-US" dirty="0" err="1"/>
+              <a:t>listes</a:t>
+            </a:r>
+            <a:endParaRPr lang="fr-BE" dirty="0"/>
+          </a:p>
+        </p:txBody>
+      </p:sp>
+      <p:sp>
+        <p:nvSpPr>
+          <p:cNvPr id="3" name="Espace réservé du contenu 2">
+            <a:extLst>
+              <a:ext uri="{FF2B5EF4-FFF2-40B4-BE49-F238E27FC236}">
+                <a16:creationId xmlns:a16="http://schemas.microsoft.com/office/drawing/2014/main" id="{C652C919-6B1D-411B-A88D-B511B9188979}"/>
+              </a:ext>
+            </a:extLst>
+          </p:cNvPr>
+          <p:cNvSpPr>
+            <a:spLocks noGrp="1"/>
+          </p:cNvSpPr>
+          <p:nvPr>
+            <p:ph idx="1"/>
+          </p:nvPr>
+        </p:nvSpPr>
+        <p:spPr/>
+        <p:txBody>
+          <a:bodyPr/>
+          <a:lstStyle/>
+          <a:p>
+            <a:pPr marL="0" indent="0">
+              <a:buNone/>
+            </a:pPr>
+            <a:r>
+              <a:rPr lang="en-US" dirty="0">
+                <a:latin typeface="Consolas" panose="020B0609020204030204" pitchFamily="49" charset="0"/>
+              </a:rPr>
+              <a:t>tuples = []</a:t>
+            </a:r>
+          </a:p>
+          <a:p>
+            <a:pPr marL="0" indent="0">
+              <a:buNone/>
+            </a:pPr>
+            <a:r>
+              <a:rPr lang="en-US" dirty="0">
+                <a:latin typeface="Consolas" panose="020B0609020204030204" pitchFamily="49" charset="0"/>
+              </a:rPr>
+              <a:t>for x in range(10):</a:t>
+            </a:r>
+          </a:p>
+          <a:p>
+            <a:pPr marL="0" indent="0">
+              <a:buNone/>
+            </a:pPr>
+            <a:r>
+              <a:rPr lang="en-US" dirty="0">
+                <a:latin typeface="Consolas" panose="020B0609020204030204" pitchFamily="49" charset="0"/>
+              </a:rPr>
+              <a:t>    for y in range(10):</a:t>
+            </a:r>
+          </a:p>
+          <a:p>
+            <a:pPr marL="0" indent="0">
+              <a:buNone/>
+            </a:pPr>
+            <a:r>
+              <a:rPr lang="en-US" dirty="0">
+                <a:latin typeface="Consolas" panose="020B0609020204030204" pitchFamily="49" charset="0"/>
+              </a:rPr>
+              <a:t>        if x != y:</a:t>
+            </a:r>
+          </a:p>
+          <a:p>
+            <a:pPr marL="0" indent="0">
+              <a:buNone/>
+            </a:pPr>
+            <a:r>
+              <a:rPr lang="en-US" dirty="0">
+                <a:latin typeface="Consolas" panose="020B0609020204030204" pitchFamily="49" charset="0"/>
+              </a:rPr>
+              <a:t>            </a:t>
+            </a:r>
+            <a:r>
+              <a:rPr lang="en-US" dirty="0" err="1">
+                <a:latin typeface="Consolas" panose="020B0609020204030204" pitchFamily="49" charset="0"/>
+              </a:rPr>
+              <a:t>tuples.append</a:t>
+            </a:r>
+            <a:r>
+              <a:rPr lang="en-US" dirty="0">
+                <a:latin typeface="Consolas" panose="020B0609020204030204" pitchFamily="49" charset="0"/>
+              </a:rPr>
+              <a:t>((x, y))</a:t>
+            </a:r>
+          </a:p>
+          <a:p>
+            <a:pPr marL="0" indent="0">
+              <a:buNone/>
+            </a:pPr>
+            <a:endParaRPr lang="en-US" dirty="0">
+              <a:latin typeface="Consolas" panose="020B0609020204030204" pitchFamily="49" charset="0"/>
+            </a:endParaRPr>
+          </a:p>
+          <a:p>
+            <a:pPr marL="0" indent="0">
+              <a:buNone/>
+            </a:pPr>
+            <a:r>
+              <a:rPr lang="en-US" dirty="0">
+                <a:latin typeface="Consolas" panose="020B0609020204030204" pitchFamily="49" charset="0"/>
+              </a:rPr>
+              <a:t>tuples = [(x, y) for x in range(10) for y in range(10) if x != y]</a:t>
+            </a:r>
+          </a:p>
+        </p:txBody>
+      </p:sp>
+    </p:spTree>
+    <p:extLst>
+      <p:ext uri="{BB962C8B-B14F-4D97-AF65-F5344CB8AC3E}">
+        <p14:creationId xmlns:p14="http://schemas.microsoft.com/office/powerpoint/2010/main" val="1383312508"/>
+      </p:ext>
+    </p:extLst>
+  </p:cSld>
+  <p:clrMapOvr>
+    <a:masterClrMapping/>
+  </p:clrMapOvr>
+</p:sld>
+</file>
+
+<file path=ppt/slides/slide31.xml><?xml version="1.0" encoding="utf-8"?>
+<p:sld xmlns:a="http://schemas.openxmlformats.org/drawingml/2006/main" xmlns:r="http://schemas.openxmlformats.org/officeDocument/2006/relationships" xmlns:p="http://schemas.openxmlformats.org/presentationml/2006/main">
+  <p:cSld>
+    <p:spTree>
+      <p:nvGrpSpPr>
+        <p:cNvPr id="1" name=""/>
+        <p:cNvGrpSpPr/>
+        <p:nvPr/>
+      </p:nvGrpSpPr>
+      <p:grpSpPr>
+        <a:xfrm>
+          <a:off x="0" y="0"/>
+          <a:ext cx="0" cy="0"/>
+          <a:chOff x="0" y="0"/>
+          <a:chExt cx="0" cy="0"/>
+        </a:xfrm>
+      </p:grpSpPr>
+      <p:sp>
+        <p:nvSpPr>
+          <p:cNvPr id="2" name="Titre 1">
+            <a:extLst>
+              <a:ext uri="{FF2B5EF4-FFF2-40B4-BE49-F238E27FC236}">
+                <a16:creationId xmlns:a16="http://schemas.microsoft.com/office/drawing/2014/main" id="{6E971868-6375-4ACA-AA55-1DC80AE8AD92}"/>
+              </a:ext>
+            </a:extLst>
+          </p:cNvPr>
+          <p:cNvSpPr>
+            <a:spLocks noGrp="1"/>
+          </p:cNvSpPr>
+          <p:nvPr>
+            <p:ph type="title"/>
+          </p:nvPr>
+        </p:nvSpPr>
+        <p:spPr/>
+        <p:txBody>
+          <a:bodyPr/>
+          <a:lstStyle/>
+          <a:p>
+            <a:r>
+              <a:rPr lang="en-US" dirty="0"/>
+              <a:t>Lecture de </a:t>
+            </a:r>
+            <a:r>
+              <a:rPr lang="en-US" dirty="0" err="1"/>
+              <a:t>fichiers</a:t>
+            </a:r>
+            <a:endParaRPr lang="fr-BE" dirty="0"/>
+          </a:p>
+        </p:txBody>
+      </p:sp>
+      <p:sp>
+        <p:nvSpPr>
+          <p:cNvPr id="3" name="Espace réservé du contenu 2">
+            <a:extLst>
+              <a:ext uri="{FF2B5EF4-FFF2-40B4-BE49-F238E27FC236}">
+                <a16:creationId xmlns:a16="http://schemas.microsoft.com/office/drawing/2014/main" id="{10B4CE25-5FD2-43D6-AA10-8B832FDB5A6D}"/>
+              </a:ext>
+            </a:extLst>
+          </p:cNvPr>
+          <p:cNvSpPr>
+            <a:spLocks noGrp="1"/>
+          </p:cNvSpPr>
+          <p:nvPr>
+            <p:ph idx="1"/>
+          </p:nvPr>
+        </p:nvSpPr>
+        <p:spPr/>
+        <p:txBody>
+          <a:bodyPr/>
+          <a:lstStyle/>
+          <a:p>
+            <a:r>
+              <a:rPr lang="en-US" dirty="0" err="1">
+                <a:latin typeface="Consolas" panose="020B0609020204030204" pitchFamily="49" charset="0"/>
+              </a:rPr>
+              <a:t>my_file</a:t>
+            </a:r>
+            <a:r>
+              <a:rPr lang="en-US" dirty="0">
+                <a:latin typeface="Consolas" panose="020B0609020204030204" pitchFamily="49" charset="0"/>
+              </a:rPr>
+              <a:t> = open("my_file.txt")</a:t>
+            </a:r>
+          </a:p>
+          <a:p>
+            <a:r>
+              <a:rPr lang="en-US" dirty="0" err="1">
+                <a:latin typeface="Consolas" panose="020B0609020204030204" pitchFamily="49" charset="0"/>
+              </a:rPr>
+              <a:t>my_file.readline</a:t>
+            </a:r>
+            <a:r>
+              <a:rPr lang="en-US" dirty="0">
+                <a:latin typeface="Consolas" panose="020B0609020204030204" pitchFamily="49" charset="0"/>
+              </a:rPr>
+              <a:t>()</a:t>
+            </a:r>
+          </a:p>
+          <a:p>
+            <a:r>
+              <a:rPr lang="en-US" dirty="0">
+                <a:latin typeface="Consolas" panose="020B0609020204030204" pitchFamily="49" charset="0"/>
+              </a:rPr>
+              <a:t>for line in </a:t>
+            </a:r>
+            <a:r>
+              <a:rPr lang="en-US" dirty="0" err="1">
+                <a:latin typeface="Consolas" panose="020B0609020204030204" pitchFamily="49" charset="0"/>
+              </a:rPr>
+              <a:t>my_file</a:t>
+            </a:r>
+            <a:r>
+              <a:rPr lang="en-US" dirty="0">
+                <a:latin typeface="Consolas" panose="020B0609020204030204" pitchFamily="49" charset="0"/>
+              </a:rPr>
+              <a:t>:</a:t>
+            </a:r>
+          </a:p>
+          <a:p>
+            <a:r>
+              <a:rPr lang="en-US" dirty="0">
+                <a:latin typeface="Consolas" panose="020B0609020204030204" pitchFamily="49" charset="0"/>
+              </a:rPr>
+              <a:t>    print(</a:t>
+            </a:r>
+            <a:r>
+              <a:rPr lang="en-US" dirty="0" err="1">
+                <a:latin typeface="Consolas" panose="020B0609020204030204" pitchFamily="49" charset="0"/>
+              </a:rPr>
+              <a:t>line.strip</a:t>
+            </a:r>
+            <a:r>
+              <a:rPr lang="en-US" dirty="0">
+                <a:latin typeface="Consolas" panose="020B0609020204030204" pitchFamily="49" charset="0"/>
+              </a:rPr>
+              <a:t>())</a:t>
+            </a:r>
+          </a:p>
+          <a:p>
+            <a:r>
+              <a:rPr lang="fr-BE" dirty="0" err="1">
+                <a:latin typeface="Consolas" panose="020B0609020204030204" pitchFamily="49" charset="0"/>
+              </a:rPr>
+              <a:t>my_file.close</a:t>
+            </a:r>
+            <a:r>
+              <a:rPr lang="fr-BE" dirty="0">
+                <a:latin typeface="Consolas" panose="020B0609020204030204" pitchFamily="49" charset="0"/>
+              </a:rPr>
+              <a:t>()</a:t>
+            </a:r>
+          </a:p>
+        </p:txBody>
+      </p:sp>
+    </p:spTree>
+    <p:extLst>
+      <p:ext uri="{BB962C8B-B14F-4D97-AF65-F5344CB8AC3E}">
+        <p14:creationId xmlns:p14="http://schemas.microsoft.com/office/powerpoint/2010/main" val="3620625972"/>
+      </p:ext>
+    </p:extLst>
+  </p:cSld>
+  <p:clrMapOvr>
+    <a:masterClrMapping/>
+  </p:clrMapOvr>
+</p:sld>
+</file>
+
+<file path=ppt/slides/slide32.xml><?xml version="1.0" encoding="utf-8"?>
+<p:sld xmlns:a="http://schemas.openxmlformats.org/drawingml/2006/main" xmlns:r="http://schemas.openxmlformats.org/officeDocument/2006/relationships" xmlns:p="http://schemas.openxmlformats.org/presentationml/2006/main">
+  <p:cSld>
+    <p:spTree>
+      <p:nvGrpSpPr>
+        <p:cNvPr id="1" name=""/>
+        <p:cNvGrpSpPr/>
+        <p:nvPr/>
+      </p:nvGrpSpPr>
+      <p:grpSpPr>
+        <a:xfrm>
+          <a:off x="0" y="0"/>
+          <a:ext cx="0" cy="0"/>
+          <a:chOff x="0" y="0"/>
+          <a:chExt cx="0" cy="0"/>
+        </a:xfrm>
+      </p:grpSpPr>
+      <p:sp>
+        <p:nvSpPr>
+          <p:cNvPr id="2" name="Titre 1">
+            <a:extLst>
+              <a:ext uri="{FF2B5EF4-FFF2-40B4-BE49-F238E27FC236}">
+                <a16:creationId xmlns:a16="http://schemas.microsoft.com/office/drawing/2014/main" id="{6E971868-6375-4ACA-AA55-1DC80AE8AD92}"/>
+              </a:ext>
+            </a:extLst>
+          </p:cNvPr>
+          <p:cNvSpPr>
+            <a:spLocks noGrp="1"/>
+          </p:cNvSpPr>
+          <p:nvPr>
+            <p:ph type="title"/>
+          </p:nvPr>
+        </p:nvSpPr>
+        <p:spPr/>
+        <p:txBody>
+          <a:bodyPr/>
+          <a:lstStyle/>
+          <a:p>
+            <a:r>
+              <a:rPr lang="en-US" dirty="0" err="1"/>
+              <a:t>Gestionnaire</a:t>
+            </a:r>
+            <a:r>
+              <a:rPr lang="en-US" dirty="0"/>
+              <a:t> de </a:t>
+            </a:r>
+            <a:r>
+              <a:rPr lang="en-US" dirty="0" err="1"/>
+              <a:t>contexte</a:t>
+            </a:r>
+            <a:endParaRPr lang="fr-BE" dirty="0"/>
+          </a:p>
+        </p:txBody>
+      </p:sp>
+      <p:sp>
+        <p:nvSpPr>
+          <p:cNvPr id="3" name="Espace réservé du contenu 2">
+            <a:extLst>
+              <a:ext uri="{FF2B5EF4-FFF2-40B4-BE49-F238E27FC236}">
+                <a16:creationId xmlns:a16="http://schemas.microsoft.com/office/drawing/2014/main" id="{10B4CE25-5FD2-43D6-AA10-8B832FDB5A6D}"/>
+              </a:ext>
+            </a:extLst>
+          </p:cNvPr>
+          <p:cNvSpPr>
+            <a:spLocks noGrp="1"/>
+          </p:cNvSpPr>
+          <p:nvPr>
+            <p:ph idx="1"/>
+          </p:nvPr>
+        </p:nvSpPr>
+        <p:spPr/>
+        <p:txBody>
+          <a:bodyPr/>
+          <a:lstStyle/>
+          <a:p>
+            <a:r>
+              <a:rPr lang="en-US" dirty="0">
+                <a:latin typeface="Consolas" panose="020B0609020204030204" pitchFamily="49" charset="0"/>
+              </a:rPr>
+              <a:t>with open("my_file.txt", encoding="utf-8") as </a:t>
+            </a:r>
+            <a:r>
+              <a:rPr lang="en-US" dirty="0" err="1">
+                <a:latin typeface="Consolas" panose="020B0609020204030204" pitchFamily="49" charset="0"/>
+              </a:rPr>
+              <a:t>my_file</a:t>
+            </a:r>
+            <a:r>
+              <a:rPr lang="en-US" dirty="0">
+                <a:latin typeface="Consolas" panose="020B0609020204030204" pitchFamily="49" charset="0"/>
+              </a:rPr>
+              <a:t>:</a:t>
+            </a:r>
+          </a:p>
+          <a:p>
+            <a:r>
+              <a:rPr lang="en-US" dirty="0">
+                <a:latin typeface="Consolas" panose="020B0609020204030204" pitchFamily="49" charset="0"/>
+              </a:rPr>
+              <a:t>    </a:t>
+            </a:r>
+            <a:r>
+              <a:rPr lang="en-US" dirty="0" err="1">
+                <a:latin typeface="Consolas" panose="020B0609020204030204" pitchFamily="49" charset="0"/>
+              </a:rPr>
+              <a:t>my_file.readline</a:t>
+            </a:r>
+            <a:r>
+              <a:rPr lang="en-US" dirty="0">
+                <a:latin typeface="Consolas" panose="020B0609020204030204" pitchFamily="49" charset="0"/>
+              </a:rPr>
+              <a:t>()</a:t>
+            </a:r>
+          </a:p>
+          <a:p>
+            <a:r>
+              <a:rPr lang="en-US" dirty="0">
+                <a:latin typeface="Consolas" panose="020B0609020204030204" pitchFamily="49" charset="0"/>
+              </a:rPr>
+              <a:t>    for line in </a:t>
+            </a:r>
+            <a:r>
+              <a:rPr lang="en-US" dirty="0" err="1">
+                <a:latin typeface="Consolas" panose="020B0609020204030204" pitchFamily="49" charset="0"/>
+              </a:rPr>
+              <a:t>my_file</a:t>
+            </a:r>
+            <a:r>
+              <a:rPr lang="en-US" dirty="0">
+                <a:latin typeface="Consolas" panose="020B0609020204030204" pitchFamily="49" charset="0"/>
+              </a:rPr>
+              <a:t>:</a:t>
+            </a:r>
+          </a:p>
+          <a:p>
+            <a:r>
+              <a:rPr lang="en-US" dirty="0">
+                <a:latin typeface="Consolas" panose="020B0609020204030204" pitchFamily="49" charset="0"/>
+              </a:rPr>
+              <a:t>        print(</a:t>
+            </a:r>
+            <a:r>
+              <a:rPr lang="en-US" dirty="0" err="1">
+                <a:latin typeface="Consolas" panose="020B0609020204030204" pitchFamily="49" charset="0"/>
+              </a:rPr>
+              <a:t>line.strip</a:t>
+            </a:r>
+            <a:r>
+              <a:rPr lang="en-US" dirty="0">
+                <a:latin typeface="Consolas" panose="020B0609020204030204" pitchFamily="49" charset="0"/>
+              </a:rPr>
+              <a:t>())</a:t>
+            </a:r>
+          </a:p>
+          <a:p>
+            <a:endParaRPr lang="en-US" dirty="0">
+              <a:latin typeface="Consolas" panose="020B0609020204030204" pitchFamily="49" charset="0"/>
+            </a:endParaRPr>
+          </a:p>
+          <a:p>
+            <a:r>
+              <a:rPr lang="en-US" dirty="0">
+                <a:latin typeface="Consolas" panose="020B0609020204030204" pitchFamily="49" charset="0"/>
+              </a:rPr>
+              <a:t>with open("output.txt", "w", encoding="utf-8") as </a:t>
+            </a:r>
+            <a:r>
+              <a:rPr lang="en-US" dirty="0" err="1">
+                <a:latin typeface="Consolas" panose="020B0609020204030204" pitchFamily="49" charset="0"/>
+              </a:rPr>
+              <a:t>out_file</a:t>
+            </a:r>
+            <a:r>
+              <a:rPr lang="en-US" dirty="0">
+                <a:latin typeface="Consolas" panose="020B0609020204030204" pitchFamily="49" charset="0"/>
+              </a:rPr>
+              <a:t>:</a:t>
+            </a:r>
+          </a:p>
+          <a:p>
+            <a:r>
+              <a:rPr lang="en-US" dirty="0">
+                <a:latin typeface="Consolas" panose="020B0609020204030204" pitchFamily="49" charset="0"/>
+              </a:rPr>
+              <a:t>    write("Hello\n")</a:t>
+            </a:r>
+          </a:p>
+          <a:p>
+            <a:r>
+              <a:rPr lang="en-US" dirty="0">
+                <a:latin typeface="Consolas" panose="020B0609020204030204" pitchFamily="49" charset="0"/>
+              </a:rPr>
+              <a:t>    write("World!\n")</a:t>
+            </a:r>
+          </a:p>
+        </p:txBody>
+      </p:sp>
+    </p:spTree>
+    <p:extLst>
+      <p:ext uri="{BB962C8B-B14F-4D97-AF65-F5344CB8AC3E}">
+        <p14:creationId xmlns:p14="http://schemas.microsoft.com/office/powerpoint/2010/main" val="1090092515"/>
+      </p:ext>
+    </p:extLst>
+  </p:cSld>
+  <p:clrMapOvr>
+    <a:masterClrMapping/>
+  </p:clrMapOvr>
+</p:sld>
+</file>
+
+<file path=ppt/slides/slide33.xml><?xml version="1.0" encoding="utf-8"?>
+<p:sld xmlns:a="http://schemas.openxmlformats.org/drawingml/2006/main" xmlns:r="http://schemas.openxmlformats.org/officeDocument/2006/relationships" xmlns:p="http://schemas.openxmlformats.org/presentationml/2006/main">
+  <p:cSld>
+    <p:spTree>
+      <p:nvGrpSpPr>
+        <p:cNvPr id="1" name=""/>
+        <p:cNvGrpSpPr/>
+        <p:nvPr/>
+      </p:nvGrpSpPr>
+      <p:grpSpPr>
+        <a:xfrm>
+          <a:off x="0" y="0"/>
+          <a:ext cx="0" cy="0"/>
+          <a:chOff x="0" y="0"/>
+          <a:chExt cx="0" cy="0"/>
+        </a:xfrm>
+      </p:grpSpPr>
+      <p:sp>
+        <p:nvSpPr>
+          <p:cNvPr id="2" name="Titre 1">
+            <a:extLst>
+              <a:ext uri="{FF2B5EF4-FFF2-40B4-BE49-F238E27FC236}">
+                <a16:creationId xmlns:a16="http://schemas.microsoft.com/office/drawing/2014/main" id="{26253EF5-D284-4745-A7C2-AF2C4FDE1EAC}"/>
+              </a:ext>
+            </a:extLst>
+          </p:cNvPr>
+          <p:cNvSpPr>
+            <a:spLocks noGrp="1"/>
+          </p:cNvSpPr>
+          <p:nvPr>
+            <p:ph type="title"/>
+          </p:nvPr>
+        </p:nvSpPr>
+        <p:spPr/>
+        <p:txBody>
+          <a:bodyPr/>
+          <a:lstStyle/>
+          <a:p>
+            <a:r>
+              <a:rPr lang="en-US" dirty="0" err="1"/>
+              <a:t>Exercice</a:t>
+            </a:r>
+            <a:r>
+              <a:rPr lang="en-US" dirty="0"/>
+              <a:t> 5</a:t>
+            </a:r>
+            <a:endParaRPr lang="fr-BE" dirty="0"/>
+          </a:p>
+        </p:txBody>
+      </p:sp>
+      <p:sp>
+        <p:nvSpPr>
+          <p:cNvPr id="3" name="Espace réservé du contenu 2">
+            <a:extLst>
+              <a:ext uri="{FF2B5EF4-FFF2-40B4-BE49-F238E27FC236}">
+                <a16:creationId xmlns:a16="http://schemas.microsoft.com/office/drawing/2014/main" id="{F882DB01-65AE-4F08-96AA-C164C048FFAF}"/>
+              </a:ext>
+            </a:extLst>
+          </p:cNvPr>
+          <p:cNvSpPr>
+            <a:spLocks noGrp="1"/>
+          </p:cNvSpPr>
+          <p:nvPr>
+            <p:ph idx="1"/>
+          </p:nvPr>
+        </p:nvSpPr>
+        <p:spPr/>
+        <p:txBody>
+          <a:bodyPr/>
+          <a:lstStyle/>
+          <a:p>
+            <a:r>
+              <a:rPr lang="en-US" dirty="0" err="1"/>
+              <a:t>Fichiers</a:t>
+            </a:r>
+            <a:endParaRPr lang="fr-BE" dirty="0"/>
+          </a:p>
+        </p:txBody>
+      </p:sp>
+    </p:spTree>
+    <p:extLst>
+      <p:ext uri="{BB962C8B-B14F-4D97-AF65-F5344CB8AC3E}">
+        <p14:creationId xmlns:p14="http://schemas.microsoft.com/office/powerpoint/2010/main" val="2966865568"/>
+      </p:ext>
+    </p:extLst>
+  </p:cSld>
+  <p:clrMapOvr>
+    <a:masterClrMapping/>
+  </p:clrMapOvr>
+</p:sld>
+</file>
+
+<file path=ppt/slides/slide34.xml><?xml version="1.0" encoding="utf-8"?>
+<p:sld xmlns:a="http://schemas.openxmlformats.org/drawingml/2006/main" xmlns:r="http://schemas.openxmlformats.org/officeDocument/2006/relationships" xmlns:p="http://schemas.openxmlformats.org/presentationml/2006/main">
+  <p:cSld>
+    <p:spTree>
+      <p:nvGrpSpPr>
+        <p:cNvPr id="1" name=""/>
+        <p:cNvGrpSpPr/>
+        <p:nvPr/>
+      </p:nvGrpSpPr>
+      <p:grpSpPr>
+        <a:xfrm>
+          <a:off x="0" y="0"/>
+          <a:ext cx="0" cy="0"/>
+          <a:chOff x="0" y="0"/>
+          <a:chExt cx="0" cy="0"/>
+        </a:xfrm>
+      </p:grpSpPr>
+      <p:sp>
+        <p:nvSpPr>
+          <p:cNvPr id="4" name="Titre 3">
+            <a:extLst>
+              <a:ext uri="{FF2B5EF4-FFF2-40B4-BE49-F238E27FC236}">
+                <a16:creationId xmlns:a16="http://schemas.microsoft.com/office/drawing/2014/main" id="{7C12A1B3-30A1-44D3-964B-8F4B3150E160}"/>
+              </a:ext>
+            </a:extLst>
+          </p:cNvPr>
+          <p:cNvSpPr>
+            <a:spLocks noGrp="1"/>
+          </p:cNvSpPr>
+          <p:nvPr>
+            <p:ph type="title"/>
+          </p:nvPr>
+        </p:nvSpPr>
+        <p:spPr/>
+        <p:txBody>
+          <a:bodyPr/>
+          <a:lstStyle/>
+          <a:p>
+            <a:r>
+              <a:rPr lang="en-US"/>
+              <a:t>Classes et </a:t>
+            </a:r>
+            <a:r>
+              <a:rPr lang="en-US" err="1"/>
+              <a:t>objets</a:t>
+            </a:r>
+            <a:endParaRPr lang="fr-BE"/>
+          </a:p>
+        </p:txBody>
+      </p:sp>
+      <p:sp>
+        <p:nvSpPr>
+          <p:cNvPr id="5" name="Espace réservé du texte 4">
+            <a:extLst>
+              <a:ext uri="{FF2B5EF4-FFF2-40B4-BE49-F238E27FC236}">
+                <a16:creationId xmlns:a16="http://schemas.microsoft.com/office/drawing/2014/main" id="{5CB98627-E081-4135-900C-B01051FF44F0}"/>
+              </a:ext>
+            </a:extLst>
+          </p:cNvPr>
+          <p:cNvSpPr>
+            <a:spLocks noGrp="1"/>
+          </p:cNvSpPr>
+          <p:nvPr>
+            <p:ph type="body" idx="1"/>
+          </p:nvPr>
+        </p:nvSpPr>
+        <p:spPr/>
+        <p:txBody>
+          <a:bodyPr/>
+          <a:lstStyle/>
+          <a:p>
+            <a:endParaRPr lang="fr-BE"/>
+          </a:p>
+        </p:txBody>
+      </p:sp>
+    </p:spTree>
+    <p:extLst>
+      <p:ext uri="{BB962C8B-B14F-4D97-AF65-F5344CB8AC3E}">
+        <p14:creationId xmlns:p14="http://schemas.microsoft.com/office/powerpoint/2010/main" val="2278141950"/>
+      </p:ext>
+    </p:extLst>
+  </p:cSld>
+  <p:clrMapOvr>
+    <a:masterClrMapping/>
+  </p:clrMapOvr>
+</p:sld>
+</file>
+
+<file path=ppt/slides/slide35.xml><?xml version="1.0" encoding="utf-8"?>
+<p:sld xmlns:a="http://schemas.openxmlformats.org/drawingml/2006/main" xmlns:r="http://schemas.openxmlformats.org/officeDocument/2006/relationships" xmlns:p="http://schemas.openxmlformats.org/presentationml/2006/main">
+  <p:cSld>
+    <p:spTree>
+      <p:nvGrpSpPr>
+        <p:cNvPr id="1" name=""/>
+        <p:cNvGrpSpPr/>
+        <p:nvPr/>
+      </p:nvGrpSpPr>
+      <p:grpSpPr>
+        <a:xfrm>
+          <a:off x="0" y="0"/>
+          <a:ext cx="0" cy="0"/>
+          <a:chOff x="0" y="0"/>
+          <a:chExt cx="0" cy="0"/>
+        </a:xfrm>
+      </p:grpSpPr>
+      <p:sp>
+        <p:nvSpPr>
+          <p:cNvPr id="2" name="Titre 1">
+            <a:extLst>
+              <a:ext uri="{FF2B5EF4-FFF2-40B4-BE49-F238E27FC236}">
+                <a16:creationId xmlns:a16="http://schemas.microsoft.com/office/drawing/2014/main" id="{BEDBDA12-EB8E-428F-B7B1-D8B47CACE37A}"/>
+              </a:ext>
+            </a:extLst>
+          </p:cNvPr>
+          <p:cNvSpPr>
+            <a:spLocks noGrp="1"/>
+          </p:cNvSpPr>
+          <p:nvPr>
+            <p:ph type="title"/>
+          </p:nvPr>
+        </p:nvSpPr>
+        <p:spPr/>
+        <p:txBody>
+          <a:bodyPr/>
+          <a:lstStyle/>
+          <a:p>
+            <a:r>
+              <a:rPr lang="en-US"/>
+              <a:t>Conventions de </a:t>
+            </a:r>
+            <a:r>
+              <a:rPr lang="en-US" err="1"/>
+              <a:t>codage</a:t>
+            </a:r>
+            <a:endParaRPr lang="fr-BE"/>
+          </a:p>
+        </p:txBody>
+      </p:sp>
+      <p:sp>
+        <p:nvSpPr>
+          <p:cNvPr id="3" name="Espace réservé du texte 2">
+            <a:extLst>
+              <a:ext uri="{FF2B5EF4-FFF2-40B4-BE49-F238E27FC236}">
+                <a16:creationId xmlns:a16="http://schemas.microsoft.com/office/drawing/2014/main" id="{B3CA63D6-C4B6-4FAB-A811-FBBC5D7185B5}"/>
+              </a:ext>
+            </a:extLst>
+          </p:cNvPr>
+          <p:cNvSpPr>
+            <a:spLocks noGrp="1"/>
+          </p:cNvSpPr>
+          <p:nvPr>
+            <p:ph type="body" idx="1"/>
+          </p:nvPr>
+        </p:nvSpPr>
+        <p:spPr/>
+        <p:txBody>
+          <a:bodyPr/>
+          <a:lstStyle/>
+          <a:p>
+            <a:endParaRPr lang="fr-BE"/>
+          </a:p>
+        </p:txBody>
+      </p:sp>
+    </p:spTree>
+    <p:extLst>
+      <p:ext uri="{BB962C8B-B14F-4D97-AF65-F5344CB8AC3E}">
+        <p14:creationId xmlns:p14="http://schemas.microsoft.com/office/powerpoint/2010/main" val="3429561253"/>
       </p:ext>
     </p:extLst>
   </p:cSld>

</xml_diff>